<commit_message>
Update presentation and related two forms.
</commit_message>
<xml_diff>
--- a/Инопланетный шахтер.pptx
+++ b/Инопланетный шахтер.pptx
@@ -5,16 +5,16 @@
     <p:sldMasterId id="2147483648" r:id="rId1"/>
   </p:sldMasterIdLst>
   <p:sldIdLst>
-    <p:sldId id="256" r:id="rId21"/>
-    <p:sldId id="257" r:id="rId22"/>
-    <p:sldId id="258" r:id="rId23"/>
-    <p:sldId id="259" r:id="rId24"/>
-    <p:sldId id="260" r:id="rId25"/>
-    <p:sldId id="261" r:id="rId26"/>
-    <p:sldId id="262" r:id="rId27"/>
-    <p:sldId id="263" r:id="rId28"/>
-    <p:sldId id="264" r:id="rId29"/>
-    <p:sldId id="265" r:id="rId30"/>
+    <p:sldId id="256" r:id="rId26"/>
+    <p:sldId id="257" r:id="rId27"/>
+    <p:sldId id="258" r:id="rId28"/>
+    <p:sldId id="259" r:id="rId29"/>
+    <p:sldId id="260" r:id="rId30"/>
+    <p:sldId id="261" r:id="rId31"/>
+    <p:sldId id="262" r:id="rId32"/>
+    <p:sldId id="263" r:id="rId33"/>
+    <p:sldId id="264" r:id="rId34"/>
+    <p:sldId id="265" r:id="rId35"/>
   </p:sldIdLst>
   <p:sldSz cx="18288000" cy="10287000"/>
   <p:notesSz cx="6858000" cy="9144000"/>
@@ -36,48 +36,68 @@
       <p:regular r:id="rId9"/>
     </p:embeddedFont>
     <p:embeddedFont>
-      <p:font typeface="Sanchez" charset="1" panose="02000000000000000000"/>
+      <p:font typeface="Open Sans Light" charset="1" panose="020B0306030504020204"/>
       <p:regular r:id="rId10"/>
     </p:embeddedFont>
     <p:embeddedFont>
-      <p:font typeface="Sanchez Italics" charset="1" panose="00000000000000000000"/>
+      <p:font typeface="Open Sans Light Bold" charset="1" panose="020B0806030504020204"/>
       <p:regular r:id="rId11"/>
     </p:embeddedFont>
     <p:embeddedFont>
-      <p:font typeface="League Spartan" charset="1" panose="00000800000000000000"/>
+      <p:font typeface="Open Sans Light Italics" charset="1" panose="020B0306030504020204"/>
       <p:regular r:id="rId12"/>
     </p:embeddedFont>
     <p:embeddedFont>
-      <p:font typeface="Montserrat Extra-Bold" charset="1" panose="00000900000000000000"/>
+      <p:font typeface="Open Sans Light Bold Italics" charset="1" panose="020B0806030504020204"/>
       <p:regular r:id="rId13"/>
     </p:embeddedFont>
     <p:embeddedFont>
-      <p:font typeface="Montserrat Extra-Bold Bold" charset="1" panose="00000A00000000000000"/>
+      <p:font typeface="Open Sans" charset="1" panose="020B0606030504020204"/>
       <p:regular r:id="rId14"/>
     </p:embeddedFont>
     <p:embeddedFont>
-      <p:font typeface="Montserrat Extra-Bold Italics" charset="1" panose="00000900000000000000"/>
+      <p:font typeface="Open Sans Bold" charset="1" panose="020B0806030504020204"/>
       <p:regular r:id="rId15"/>
     </p:embeddedFont>
     <p:embeddedFont>
-      <p:font typeface="Montserrat Extra-Bold Bold Italics" charset="1" panose="00000A00000000000000"/>
+      <p:font typeface="Open Sans Italics" charset="1" panose="020B0606030504020204"/>
       <p:regular r:id="rId16"/>
     </p:embeddedFont>
     <p:embeddedFont>
-      <p:font typeface="Montserrat Semi-Bold" charset="1" panose="00000700000000000000"/>
+      <p:font typeface="Open Sans Bold Italics" charset="1" panose="020B0806030504020204"/>
       <p:regular r:id="rId17"/>
     </p:embeddedFont>
     <p:embeddedFont>
-      <p:font typeface="Montserrat Semi-Bold Bold" charset="1" panose="00000800000000000000"/>
+      <p:font typeface="Montserrat Extra-Bold" charset="1" panose="00000900000000000000"/>
       <p:regular r:id="rId18"/>
     </p:embeddedFont>
     <p:embeddedFont>
-      <p:font typeface="Montserrat Semi-Bold Italics" charset="1" panose="00000700000000000000"/>
+      <p:font typeface="Montserrat Extra-Bold Bold" charset="1" panose="00000A00000000000000"/>
       <p:regular r:id="rId19"/>
     </p:embeddedFont>
     <p:embeddedFont>
+      <p:font typeface="Montserrat Extra-Bold Italics" charset="1" panose="00000900000000000000"/>
+      <p:regular r:id="rId20"/>
+    </p:embeddedFont>
+    <p:embeddedFont>
+      <p:font typeface="Montserrat Extra-Bold Bold Italics" charset="1" panose="00000A00000000000000"/>
+      <p:regular r:id="rId21"/>
+    </p:embeddedFont>
+    <p:embeddedFont>
+      <p:font typeface="Montserrat Semi-Bold" charset="1" panose="00000700000000000000"/>
+      <p:regular r:id="rId22"/>
+    </p:embeddedFont>
+    <p:embeddedFont>
+      <p:font typeface="Montserrat Semi-Bold Bold" charset="1" panose="00000800000000000000"/>
+      <p:regular r:id="rId23"/>
+    </p:embeddedFont>
+    <p:embeddedFont>
+      <p:font typeface="Montserrat Semi-Bold Italics" charset="1" panose="00000700000000000000"/>
+      <p:regular r:id="rId24"/>
+    </p:embeddedFont>
+    <p:embeddedFont>
       <p:font typeface="Montserrat Semi-Bold Bold Italics" charset="1" panose="00000800000000000000"/>
-      <p:regular r:id="rId20"/>
+      <p:regular r:id="rId25"/>
     </p:embeddedFont>
   </p:embeddedFontLst>
   <p:defaultTextStyle>
@@ -3352,881 +3372,6 @@
           <a:chExt cx="0" cy="0"/>
         </a:xfrm>
       </p:grpSpPr>
-      <p:sp>
-        <p:nvSpPr>
-          <p:cNvPr name="AutoShape 2" id="2"/>
-          <p:cNvSpPr/>
-          <p:nvPr/>
-        </p:nvSpPr>
-        <p:spPr>
-          <a:xfrm rot="0">
-            <a:off x="9144000" y="2971800"/>
-            <a:ext cx="8534400" cy="6629400"/>
-          </a:xfrm>
-          <a:prstGeom prst="rect">
-            <a:avLst/>
-          </a:prstGeom>
-          <a:solidFill>
-            <a:srgbClr val="40C6CC"/>
-          </a:solidFill>
-        </p:spPr>
-      </p:sp>
-      <p:sp>
-        <p:nvSpPr>
-          <p:cNvPr name="AutoShape 3" id="3"/>
-          <p:cNvSpPr/>
-          <p:nvPr/>
-        </p:nvSpPr>
-        <p:spPr>
-          <a:xfrm rot="0">
-            <a:off x="609600" y="2971800"/>
-            <a:ext cx="8534400" cy="6629400"/>
-          </a:xfrm>
-          <a:prstGeom prst="rect">
-            <a:avLst/>
-          </a:prstGeom>
-          <a:solidFill>
-            <a:srgbClr val="F7F9F8"/>
-          </a:solidFill>
-        </p:spPr>
-      </p:sp>
-      <p:grpSp>
-        <p:nvGrpSpPr>
-          <p:cNvPr name="Group 4" id="4"/>
-          <p:cNvGrpSpPr/>
-          <p:nvPr/>
-        </p:nvGrpSpPr>
-        <p:grpSpPr>
-          <a:xfrm rot="0">
-            <a:off x="9870560" y="3881437"/>
-            <a:ext cx="1495425" cy="1495425"/>
-            <a:chOff x="0" y="0"/>
-            <a:chExt cx="6350000" cy="6350000"/>
-          </a:xfrm>
-        </p:grpSpPr>
-        <p:sp>
-          <p:nvSpPr>
-            <p:cNvPr name="Freeform 5" id="5"/>
-            <p:cNvSpPr/>
-            <p:nvPr/>
-          </p:nvSpPr>
-          <p:spPr>
-            <a:xfrm>
-              <a:off x="14167" y="0"/>
-              <a:ext cx="6321665" cy="6350000"/>
-            </a:xfrm>
-            <a:custGeom>
-              <a:avLst/>
-              <a:gdLst/>
-              <a:ahLst/>
-              <a:cxnLst/>
-              <a:rect r="r" b="b" t="t" l="l"/>
-              <a:pathLst>
-                <a:path h="6350000" w="6321665">
-                  <a:moveTo>
-                    <a:pt x="3160833" y="0"/>
-                  </a:moveTo>
-                  <a:lnTo>
-                    <a:pt x="3160833" y="0"/>
-                  </a:lnTo>
-                  <a:cubicBezTo>
-                    <a:pt x="4908795" y="7817"/>
-                    <a:pt x="6321666" y="1427021"/>
-                    <a:pt x="6321666" y="3175000"/>
-                  </a:cubicBezTo>
-                  <a:cubicBezTo>
-                    <a:pt x="6321666" y="4922979"/>
-                    <a:pt x="4908795" y="6342183"/>
-                    <a:pt x="3160833" y="6350000"/>
-                  </a:cubicBezTo>
-                  <a:cubicBezTo>
-                    <a:pt x="1412871" y="6342183"/>
-                    <a:pt x="0" y="4922979"/>
-                    <a:pt x="0" y="3175000"/>
-                  </a:cubicBezTo>
-                  <a:cubicBezTo>
-                    <a:pt x="0" y="1427021"/>
-                    <a:pt x="1412871" y="7817"/>
-                    <a:pt x="3160833" y="0"/>
-                  </a:cubicBezTo>
-                  <a:close/>
-                </a:path>
-              </a:pathLst>
-            </a:custGeom>
-            <a:solidFill>
-              <a:srgbClr val="231F1D"/>
-            </a:solidFill>
-          </p:spPr>
-        </p:sp>
-      </p:grpSp>
-      <p:sp>
-        <p:nvSpPr>
-          <p:cNvPr name="TextBox 6" id="6"/>
-          <p:cNvSpPr txBox="true"/>
-          <p:nvPr/>
-        </p:nvSpPr>
-        <p:spPr>
-          <a:xfrm rot="0">
-            <a:off x="10176104" y="4089511"/>
-            <a:ext cx="884337" cy="857250"/>
-          </a:xfrm>
-          <a:prstGeom prst="rect">
-            <a:avLst/>
-          </a:prstGeom>
-        </p:spPr>
-        <p:txBody>
-          <a:bodyPr anchor="t" rtlCol="false" tIns="0" lIns="0" bIns="0" rIns="0">
-            <a:spAutoFit/>
-          </a:bodyPr>
-          <a:lstStyle/>
-          <a:p>
-            <a:pPr algn="ctr">
-              <a:lnSpc>
-                <a:spcPts val="7000"/>
-              </a:lnSpc>
-            </a:pPr>
-            <a:r>
-              <a:rPr lang="en-US" sz="5000">
-                <a:solidFill>
-                  <a:srgbClr val="F7F9F8"/>
-                </a:solidFill>
-                <a:latin typeface="Montserrat Semi-Bold Bold"/>
-              </a:rPr>
-              <a:t>2</a:t>
-            </a:r>
-          </a:p>
-        </p:txBody>
-      </p:sp>
-      <p:grpSp>
-        <p:nvGrpSpPr>
-          <p:cNvPr name="Group 7" id="7"/>
-          <p:cNvGrpSpPr/>
-          <p:nvPr/>
-        </p:nvGrpSpPr>
-        <p:grpSpPr>
-          <a:xfrm rot="0">
-            <a:off x="1336160" y="3881437"/>
-            <a:ext cx="1495425" cy="1495425"/>
-            <a:chOff x="0" y="0"/>
-            <a:chExt cx="6350000" cy="6350000"/>
-          </a:xfrm>
-        </p:grpSpPr>
-        <p:sp>
-          <p:nvSpPr>
-            <p:cNvPr name="Freeform 8" id="8"/>
-            <p:cNvSpPr/>
-            <p:nvPr/>
-          </p:nvSpPr>
-          <p:spPr>
-            <a:xfrm>
-              <a:off x="14167" y="0"/>
-              <a:ext cx="6321665" cy="6350000"/>
-            </a:xfrm>
-            <a:custGeom>
-              <a:avLst/>
-              <a:gdLst/>
-              <a:ahLst/>
-              <a:cxnLst/>
-              <a:rect r="r" b="b" t="t" l="l"/>
-              <a:pathLst>
-                <a:path h="6350000" w="6321665">
-                  <a:moveTo>
-                    <a:pt x="3160833" y="0"/>
-                  </a:moveTo>
-                  <a:lnTo>
-                    <a:pt x="3160833" y="0"/>
-                  </a:lnTo>
-                  <a:cubicBezTo>
-                    <a:pt x="4908795" y="7817"/>
-                    <a:pt x="6321666" y="1427021"/>
-                    <a:pt x="6321666" y="3175000"/>
-                  </a:cubicBezTo>
-                  <a:cubicBezTo>
-                    <a:pt x="6321666" y="4922979"/>
-                    <a:pt x="4908795" y="6342183"/>
-                    <a:pt x="3160833" y="6350000"/>
-                  </a:cubicBezTo>
-                  <a:cubicBezTo>
-                    <a:pt x="1412871" y="6342183"/>
-                    <a:pt x="0" y="4922979"/>
-                    <a:pt x="0" y="3175000"/>
-                  </a:cubicBezTo>
-                  <a:cubicBezTo>
-                    <a:pt x="0" y="1427021"/>
-                    <a:pt x="1412871" y="7817"/>
-                    <a:pt x="3160833" y="0"/>
-                  </a:cubicBezTo>
-                  <a:close/>
-                </a:path>
-              </a:pathLst>
-            </a:custGeom>
-            <a:solidFill>
-              <a:srgbClr val="40C6CC"/>
-            </a:solidFill>
-          </p:spPr>
-        </p:sp>
-      </p:grpSp>
-      <p:sp>
-        <p:nvSpPr>
-          <p:cNvPr name="TextBox 9" id="9"/>
-          <p:cNvSpPr txBox="true"/>
-          <p:nvPr/>
-        </p:nvSpPr>
-        <p:spPr>
-          <a:xfrm rot="0">
-            <a:off x="1641704" y="4089511"/>
-            <a:ext cx="884337" cy="857250"/>
-          </a:xfrm>
-          <a:prstGeom prst="rect">
-            <a:avLst/>
-          </a:prstGeom>
-        </p:spPr>
-        <p:txBody>
-          <a:bodyPr anchor="t" rtlCol="false" tIns="0" lIns="0" bIns="0" rIns="0">
-            <a:spAutoFit/>
-          </a:bodyPr>
-          <a:lstStyle/>
-          <a:p>
-            <a:pPr algn="ctr">
-              <a:lnSpc>
-                <a:spcPts val="7000"/>
-              </a:lnSpc>
-            </a:pPr>
-            <a:r>
-              <a:rPr lang="en-US" sz="5000">
-                <a:solidFill>
-                  <a:srgbClr val="F7F9F8"/>
-                </a:solidFill>
-                <a:latin typeface="Montserrat Semi-Bold Bold"/>
-              </a:rPr>
-              <a:t>1</a:t>
-            </a:r>
-          </a:p>
-        </p:txBody>
-      </p:sp>
-      <p:grpSp>
-        <p:nvGrpSpPr>
-          <p:cNvPr name="Group 10" id="10"/>
-          <p:cNvGrpSpPr/>
-          <p:nvPr/>
-        </p:nvGrpSpPr>
-        <p:grpSpPr>
-          <a:xfrm rot="0">
-            <a:off x="1336160" y="443836"/>
-            <a:ext cx="16230600" cy="3929216"/>
-            <a:chOff x="0" y="0"/>
-            <a:chExt cx="21640800" cy="5238954"/>
-          </a:xfrm>
-        </p:grpSpPr>
-        <p:sp>
-          <p:nvSpPr>
-            <p:cNvPr name="TextBox 11" id="11"/>
-            <p:cNvSpPr txBox="true"/>
-            <p:nvPr/>
-          </p:nvSpPr>
-          <p:spPr>
-            <a:xfrm rot="0">
-              <a:off x="0" y="-133350"/>
-              <a:ext cx="21640800" cy="2993489"/>
-            </a:xfrm>
-            <a:prstGeom prst="rect">
-              <a:avLst/>
-            </a:prstGeom>
-          </p:spPr>
-          <p:txBody>
-            <a:bodyPr anchor="t" rtlCol="false" tIns="0" lIns="0" bIns="0" rIns="0">
-              <a:spAutoFit/>
-            </a:bodyPr>
-            <a:lstStyle/>
-            <a:p>
-              <a:pPr algn="l">
-                <a:lnSpc>
-                  <a:spcPts val="18322"/>
-                </a:lnSpc>
-              </a:pPr>
-              <a:r>
-                <a:rPr lang="en-US" sz="14094">
-                  <a:solidFill>
-                    <a:srgbClr val="FFFFFF"/>
-                  </a:solidFill>
-                  <a:latin typeface="Montserrat Semi-Bold"/>
-                </a:rPr>
-                <a:t>ФИЧИ</a:t>
-              </a:r>
-            </a:p>
-          </p:txBody>
-        </p:sp>
-        <p:sp>
-          <p:nvSpPr>
-            <p:cNvPr name="TextBox 12" id="12"/>
-            <p:cNvSpPr txBox="true"/>
-            <p:nvPr/>
-          </p:nvSpPr>
-          <p:spPr>
-            <a:xfrm rot="0">
-              <a:off x="0" y="3087762"/>
-              <a:ext cx="21640800" cy="2151193"/>
-            </a:xfrm>
-            <a:prstGeom prst="rect">
-              <a:avLst/>
-            </a:prstGeom>
-          </p:spPr>
-          <p:txBody>
-            <a:bodyPr anchor="t" rtlCol="false" tIns="0" lIns="0" bIns="0" rIns="0">
-              <a:spAutoFit/>
-            </a:bodyPr>
-            <a:lstStyle/>
-            <a:p>
-              <a:pPr algn="l">
-                <a:lnSpc>
-                  <a:spcPts val="13660"/>
-                </a:lnSpc>
-              </a:pPr>
-            </a:p>
-          </p:txBody>
-        </p:sp>
-      </p:grpSp>
-      <p:grpSp>
-        <p:nvGrpSpPr>
-          <p:cNvPr name="Group 13" id="13"/>
-          <p:cNvGrpSpPr/>
-          <p:nvPr/>
-        </p:nvGrpSpPr>
-        <p:grpSpPr>
-          <a:xfrm rot="0">
-            <a:off x="3231084" y="4373052"/>
-            <a:ext cx="5613970" cy="3732730"/>
-            <a:chOff x="0" y="0"/>
-            <a:chExt cx="7485293" cy="4976974"/>
-          </a:xfrm>
-        </p:grpSpPr>
-        <p:sp>
-          <p:nvSpPr>
-            <p:cNvPr name="TextBox 14" id="14"/>
-            <p:cNvSpPr txBox="true"/>
-            <p:nvPr/>
-          </p:nvSpPr>
-          <p:spPr>
-            <a:xfrm rot="0">
-              <a:off x="0" y="-47625"/>
-              <a:ext cx="7485293" cy="1031875"/>
-            </a:xfrm>
-            <a:prstGeom prst="rect">
-              <a:avLst/>
-            </a:prstGeom>
-          </p:spPr>
-          <p:txBody>
-            <a:bodyPr anchor="t" rtlCol="false" tIns="0" lIns="0" bIns="0" rIns="0">
-              <a:spAutoFit/>
-            </a:bodyPr>
-            <a:lstStyle/>
-            <a:p>
-              <a:pPr algn="l">
-                <a:lnSpc>
-                  <a:spcPts val="6337"/>
-                </a:lnSpc>
-              </a:pPr>
-              <a:r>
-                <a:rPr lang="en-US" sz="4875">
-                  <a:solidFill>
-                    <a:srgbClr val="000000"/>
-                  </a:solidFill>
-                  <a:latin typeface="League Spartan"/>
-                </a:rPr>
-                <a:t>KONAMI CODE</a:t>
-              </a:r>
-            </a:p>
-          </p:txBody>
-        </p:sp>
-        <p:sp>
-          <p:nvSpPr>
-            <p:cNvPr name="TextBox 15" id="15"/>
-            <p:cNvSpPr txBox="true"/>
-            <p:nvPr/>
-          </p:nvSpPr>
-          <p:spPr>
-            <a:xfrm rot="0">
-              <a:off x="0" y="1062199"/>
-              <a:ext cx="7485293" cy="3914775"/>
-            </a:xfrm>
-            <a:prstGeom prst="rect">
-              <a:avLst/>
-            </a:prstGeom>
-          </p:spPr>
-          <p:txBody>
-            <a:bodyPr anchor="t" rtlCol="false" tIns="0" lIns="0" bIns="0" rIns="0">
-              <a:spAutoFit/>
-            </a:bodyPr>
-            <a:lstStyle/>
-            <a:p>
-              <a:pPr>
-                <a:lnSpc>
-                  <a:spcPts val="4725"/>
-                </a:lnSpc>
-              </a:pPr>
-              <a:r>
-                <a:rPr lang="en-US" sz="3375">
-                  <a:solidFill>
-                    <a:srgbClr val="000000"/>
-                  </a:solidFill>
-                  <a:latin typeface="Sanchez"/>
-                </a:rPr>
-                <a:t>Конами код самый знаменитый чит-код </a:t>
-              </a:r>
-            </a:p>
-            <a:p>
-              <a:pPr>
-                <a:lnSpc>
-                  <a:spcPts val="4725"/>
-                </a:lnSpc>
-              </a:pPr>
-              <a:r>
-                <a:rPr lang="en-US" sz="3375">
-                  <a:solidFill>
-                    <a:srgbClr val="000000"/>
-                  </a:solidFill>
-                  <a:latin typeface="Sanchez"/>
-                </a:rPr>
-                <a:t>в истории.</a:t>
-              </a:r>
-            </a:p>
-            <a:p>
-              <a:pPr>
-                <a:lnSpc>
-                  <a:spcPts val="4725"/>
-                </a:lnSpc>
-              </a:pPr>
-              <a:r>
-                <a:rPr lang="en-US" sz="3375">
-                  <a:solidFill>
-                    <a:srgbClr val="000000"/>
-                  </a:solidFill>
-                  <a:latin typeface="Sanchez"/>
-                </a:rPr>
-                <a:t>Он работает и </a:t>
-              </a:r>
-            </a:p>
-            <a:p>
-              <a:pPr algn="l">
-                <a:lnSpc>
-                  <a:spcPts val="4725"/>
-                </a:lnSpc>
-              </a:pPr>
-              <a:r>
-                <a:rPr lang="en-US" sz="3375">
-                  <a:solidFill>
-                    <a:srgbClr val="000000"/>
-                  </a:solidFill>
-                  <a:latin typeface="Sanchez"/>
-                </a:rPr>
-                <a:t>в этой игре</a:t>
-              </a:r>
-            </a:p>
-          </p:txBody>
-        </p:sp>
-      </p:grpSp>
-    </p:spTree>
-  </p:cSld>
-  <p:clrMapOvr>
-    <a:masterClrMapping/>
-  </p:clrMapOvr>
-</p:sld>
-</file>
-
-<file path=ppt/slides/slide2.xml><?xml version="1.0" encoding="utf-8"?>
-<p:sld xmlns:p="http://schemas.openxmlformats.org/presentationml/2006/main" xmlns:a="http://schemas.openxmlformats.org/drawingml/2006/main" xmlns:r="http://schemas.openxmlformats.org/officeDocument/2006/relationships">
-  <p:cSld>
-    <p:bg>
-      <p:bgPr>
-        <a:solidFill>
-          <a:srgbClr val="231F1D"/>
-        </a:solidFill>
-      </p:bgPr>
-    </p:bg>
-    <p:spTree>
-      <p:nvGrpSpPr>
-        <p:cNvPr id="1" name=""/>
-        <p:cNvGrpSpPr/>
-        <p:nvPr/>
-      </p:nvGrpSpPr>
-      <p:grpSpPr>
-        <a:xfrm>
-          <a:off x="0" y="0"/>
-          <a:ext cx="0" cy="0"/>
-          <a:chOff x="0" y="0"/>
-          <a:chExt cx="0" cy="0"/>
-        </a:xfrm>
-      </p:grpSpPr>
-      <p:sp>
-        <p:nvSpPr>
-          <p:cNvPr name="AutoShape 2" id="2"/>
-          <p:cNvSpPr/>
-          <p:nvPr/>
-        </p:nvSpPr>
-        <p:spPr>
-          <a:xfrm rot="0">
-            <a:off x="-507744" y="-719806"/>
-            <a:ext cx="12630839" cy="11726613"/>
-          </a:xfrm>
-          <a:prstGeom prst="rect">
-            <a:avLst/>
-          </a:prstGeom>
-          <a:solidFill>
-            <a:srgbClr val="F7F9F8"/>
-          </a:solidFill>
-        </p:spPr>
-      </p:sp>
-      <p:pic>
-        <p:nvPicPr>
-          <p:cNvPr name="Picture 3" id="3"/>
-          <p:cNvPicPr>
-            <a:picLocks noChangeAspect="true"/>
-          </p:cNvPicPr>
-          <p:nvPr/>
-        </p:nvPicPr>
-        <p:blipFill>
-          <a:blip r:embed="rId2"/>
-          <a:srcRect l="712" t="0" r="11394" b="1360"/>
-          <a:stretch>
-            <a:fillRect/>
-          </a:stretch>
-        </p:blipFill>
-        <p:spPr>
-          <a:xfrm flipH="false" flipV="false" rot="0">
-            <a:off x="12123095" y="24670"/>
-            <a:ext cx="6078127" cy="10262330"/>
-          </a:xfrm>
-          <a:prstGeom prst="rect">
-            <a:avLst/>
-          </a:prstGeom>
-        </p:spPr>
-      </p:pic>
-      <p:grpSp>
-        <p:nvGrpSpPr>
-          <p:cNvPr name="Group 4" id="4"/>
-          <p:cNvGrpSpPr/>
-          <p:nvPr/>
-        </p:nvGrpSpPr>
-        <p:grpSpPr>
-          <a:xfrm rot="0">
-            <a:off x="1435117" y="2279364"/>
-            <a:ext cx="8633316" cy="4731971"/>
-            <a:chOff x="0" y="0"/>
-            <a:chExt cx="11511088" cy="6309294"/>
-          </a:xfrm>
-        </p:grpSpPr>
-        <p:sp>
-          <p:nvSpPr>
-            <p:cNvPr name="TextBox 5" id="5"/>
-            <p:cNvSpPr txBox="true"/>
-            <p:nvPr/>
-          </p:nvSpPr>
-          <p:spPr>
-            <a:xfrm rot="0">
-              <a:off x="0" y="26458"/>
-              <a:ext cx="11511088" cy="1393825"/>
-            </a:xfrm>
-            <a:prstGeom prst="rect">
-              <a:avLst/>
-            </a:prstGeom>
-          </p:spPr>
-          <p:txBody>
-            <a:bodyPr anchor="t" rtlCol="false" tIns="0" lIns="0" bIns="0" rIns="0">
-              <a:spAutoFit/>
-            </a:bodyPr>
-            <a:lstStyle/>
-            <a:p>
-              <a:pPr algn="l">
-                <a:lnSpc>
-                  <a:spcPts val="8050"/>
-                </a:lnSpc>
-              </a:pPr>
-              <a:r>
-                <a:rPr lang="en-US" sz="6999">
-                  <a:solidFill>
-                    <a:srgbClr val="231F1D"/>
-                  </a:solidFill>
-                  <a:latin typeface="Montserrat Semi-Bold"/>
-                </a:rPr>
-                <a:t>ОБ ИГРЕ</a:t>
-              </a:r>
-            </a:p>
-          </p:txBody>
-        </p:sp>
-        <p:sp>
-          <p:nvSpPr>
-            <p:cNvPr name="TextBox 6" id="6"/>
-            <p:cNvSpPr txBox="true"/>
-            <p:nvPr/>
-          </p:nvSpPr>
-          <p:spPr>
-            <a:xfrm rot="0">
-              <a:off x="0" y="1884154"/>
-              <a:ext cx="10912891" cy="669290"/>
-            </a:xfrm>
-            <a:prstGeom prst="rect">
-              <a:avLst/>
-            </a:prstGeom>
-          </p:spPr>
-          <p:txBody>
-            <a:bodyPr anchor="t" rtlCol="false" tIns="0" lIns="0" bIns="0" rIns="0">
-              <a:spAutoFit/>
-            </a:bodyPr>
-            <a:lstStyle/>
-            <a:p>
-              <a:pPr algn="l">
-                <a:lnSpc>
-                  <a:spcPts val="4000"/>
-                </a:lnSpc>
-              </a:pPr>
-            </a:p>
-          </p:txBody>
-        </p:sp>
-        <p:sp>
-          <p:nvSpPr>
-            <p:cNvPr name="TextBox 7" id="7"/>
-            <p:cNvSpPr txBox="true"/>
-            <p:nvPr/>
-          </p:nvSpPr>
-          <p:spPr>
-            <a:xfrm rot="0">
-              <a:off x="0" y="2720909"/>
-              <a:ext cx="10853744" cy="3845560"/>
-            </a:xfrm>
-            <a:prstGeom prst="rect">
-              <a:avLst/>
-            </a:prstGeom>
-          </p:spPr>
-          <p:txBody>
-            <a:bodyPr anchor="t" rtlCol="false" tIns="0" lIns="0" bIns="0" rIns="0">
-              <a:spAutoFit/>
-            </a:bodyPr>
-            <a:lstStyle/>
-            <a:p>
-              <a:pPr>
-                <a:lnSpc>
-                  <a:spcPts val="3900"/>
-                </a:lnSpc>
-              </a:pPr>
-              <a:r>
-                <a:rPr lang="en-US" sz="2600" spc="130">
-                  <a:solidFill>
-                    <a:srgbClr val="231F1D"/>
-                  </a:solidFill>
-                  <a:latin typeface="Montserrat Semi-Bold"/>
-                </a:rPr>
-                <a:t>Цель игры обойти все препятствия, найти инопланетную руду и вернуться живым на корабль. </a:t>
-              </a:r>
-            </a:p>
-            <a:p>
-              <a:pPr algn="l">
-                <a:lnSpc>
-                  <a:spcPts val="3900"/>
-                </a:lnSpc>
-              </a:pPr>
-              <a:r>
-                <a:rPr lang="en-US" sz="2600" spc="130">
-                  <a:solidFill>
-                    <a:srgbClr val="231F1D"/>
-                  </a:solidFill>
-                  <a:latin typeface="Montserrat Semi-Bold"/>
-                </a:rPr>
-                <a:t>На пути к цели могут встретиться такие препятствия, как лавовое озеро и глубокая пропасть</a:t>
-              </a:r>
-            </a:p>
-          </p:txBody>
-        </p:sp>
-      </p:grpSp>
-      <p:sp>
-        <p:nvSpPr>
-          <p:cNvPr name="TextBox 8" id="8"/>
-          <p:cNvSpPr txBox="true"/>
-          <p:nvPr/>
-        </p:nvSpPr>
-        <p:spPr>
-          <a:xfrm rot="0">
-            <a:off x="5751775" y="9702174"/>
-            <a:ext cx="11909119" cy="287655"/>
-          </a:xfrm>
-          <a:prstGeom prst="rect">
-            <a:avLst/>
-          </a:prstGeom>
-        </p:spPr>
-        <p:txBody>
-          <a:bodyPr anchor="t" rtlCol="false" tIns="0" lIns="0" bIns="0" rIns="0">
-            <a:spAutoFit/>
-          </a:bodyPr>
-          <a:lstStyle/>
-          <a:p>
-            <a:pPr algn="r">
-              <a:lnSpc>
-                <a:spcPts val="2379"/>
-              </a:lnSpc>
-            </a:pPr>
-            <a:r>
-              <a:rPr lang="en-US" sz="1700" spc="170">
-                <a:solidFill>
-                  <a:srgbClr val="231F1D"/>
-                </a:solidFill>
-                <a:latin typeface="Montserrat Semi-Bold"/>
-              </a:rPr>
-              <a:t>ФД Лето 2020</a:t>
-            </a:r>
-          </a:p>
-        </p:txBody>
-      </p:sp>
-    </p:spTree>
-  </p:cSld>
-  <p:clrMapOvr>
-    <a:masterClrMapping/>
-  </p:clrMapOvr>
-</p:sld>
-</file>
-
-<file path=ppt/slides/slide3.xml><?xml version="1.0" encoding="utf-8"?>
-<p:sld xmlns:p="http://schemas.openxmlformats.org/presentationml/2006/main" xmlns:a="http://schemas.openxmlformats.org/drawingml/2006/main" xmlns:r="http://schemas.openxmlformats.org/officeDocument/2006/relationships">
-  <p:cSld>
-    <p:bg>
-      <p:bgPr>
-        <a:solidFill>
-          <a:srgbClr val="231F1D"/>
-        </a:solidFill>
-      </p:bgPr>
-    </p:bg>
-    <p:spTree>
-      <p:nvGrpSpPr>
-        <p:cNvPr id="1" name=""/>
-        <p:cNvGrpSpPr/>
-        <p:nvPr/>
-      </p:nvGrpSpPr>
-      <p:grpSpPr>
-        <a:xfrm>
-          <a:off x="0" y="0"/>
-          <a:ext cx="0" cy="0"/>
-          <a:chOff x="0" y="0"/>
-          <a:chExt cx="0" cy="0"/>
-        </a:xfrm>
-      </p:grpSpPr>
-      <p:pic>
-        <p:nvPicPr>
-          <p:cNvPr name="Picture 2" id="2"/>
-          <p:cNvPicPr>
-            <a:picLocks noChangeAspect="true"/>
-          </p:cNvPicPr>
-          <p:nvPr/>
-        </p:nvPicPr>
-        <p:blipFill>
-          <a:blip r:embed="rId2"/>
-          <a:srcRect l="0" t="0" r="0" b="0"/>
-          <a:stretch>
-            <a:fillRect/>
-          </a:stretch>
-        </p:blipFill>
-        <p:spPr>
-          <a:xfrm flipH="false" flipV="false" rot="0">
-            <a:off x="1028700" y="0"/>
-            <a:ext cx="6870246" cy="10287000"/>
-          </a:xfrm>
-          <a:prstGeom prst="rect">
-            <a:avLst/>
-          </a:prstGeom>
-        </p:spPr>
-      </p:pic>
-      <p:pic>
-        <p:nvPicPr>
-          <p:cNvPr name="Picture 3" id="3"/>
-          <p:cNvPicPr>
-            <a:picLocks noChangeAspect="true"/>
-          </p:cNvPicPr>
-          <p:nvPr/>
-        </p:nvPicPr>
-        <p:blipFill>
-          <a:blip r:embed="rId3"/>
-          <a:srcRect l="0" t="0" r="0" b="0"/>
-          <a:stretch>
-            <a:fillRect/>
-          </a:stretch>
-        </p:blipFill>
-        <p:spPr>
-          <a:xfrm flipH="false" flipV="false" rot="0">
-            <a:off x="10421542" y="0"/>
-            <a:ext cx="6837758" cy="10287000"/>
-          </a:xfrm>
-          <a:prstGeom prst="rect">
-            <a:avLst/>
-          </a:prstGeom>
-        </p:spPr>
-      </p:pic>
-      <p:sp>
-        <p:nvSpPr>
-          <p:cNvPr name="TextBox 4" id="4"/>
-          <p:cNvSpPr txBox="true"/>
-          <p:nvPr/>
-        </p:nvSpPr>
-        <p:spPr>
-          <a:xfrm rot="0">
-            <a:off x="5751775" y="9702174"/>
-            <a:ext cx="11909119" cy="287655"/>
-          </a:xfrm>
-          <a:prstGeom prst="rect">
-            <a:avLst/>
-          </a:prstGeom>
-        </p:spPr>
-        <p:txBody>
-          <a:bodyPr anchor="t" rtlCol="false" tIns="0" lIns="0" bIns="0" rIns="0">
-            <a:spAutoFit/>
-          </a:bodyPr>
-          <a:lstStyle/>
-          <a:p>
-            <a:pPr algn="r">
-              <a:lnSpc>
-                <a:spcPts val="2379"/>
-              </a:lnSpc>
-            </a:pPr>
-            <a:r>
-              <a:rPr lang="en-US" sz="1700" spc="170">
-                <a:solidFill>
-                  <a:srgbClr val="231F1D"/>
-                </a:solidFill>
-                <a:latin typeface="Montserrat Semi-Bold"/>
-              </a:rPr>
-              <a:t>ФД Лето 2020</a:t>
-            </a:r>
-          </a:p>
-        </p:txBody>
-      </p:sp>
-    </p:spTree>
-  </p:cSld>
-  <p:clrMapOvr>
-    <a:masterClrMapping/>
-  </p:clrMapOvr>
-</p:sld>
-</file>
-
-<file path=ppt/slides/slide4.xml><?xml version="1.0" encoding="utf-8"?>
-<p:sld xmlns:p="http://schemas.openxmlformats.org/presentationml/2006/main" xmlns:a="http://schemas.openxmlformats.org/drawingml/2006/main">
-  <p:cSld>
-    <p:bg>
-      <p:bgPr>
-        <a:solidFill>
-          <a:srgbClr val="231F1D"/>
-        </a:solidFill>
-      </p:bgPr>
-    </p:bg>
-    <p:spTree>
-      <p:nvGrpSpPr>
-        <p:cNvPr id="1" name=""/>
-        <p:cNvGrpSpPr/>
-        <p:nvPr/>
-      </p:nvGrpSpPr>
-      <p:grpSpPr>
-        <a:xfrm>
-          <a:off x="0" y="0"/>
-          <a:ext cx="0" cy="0"/>
-          <a:chOff x="0" y="0"/>
-          <a:chExt cx="0" cy="0"/>
-        </a:xfrm>
-      </p:grpSpPr>
       <p:grpSp>
         <p:nvGrpSpPr>
           <p:cNvPr name="Group 2" id="2"/>
@@ -4402,7 +3547,7 @@
 </p:sld>
 </file>
 
-<file path=ppt/slides/slide5.xml><?xml version="1.0" encoding="utf-8"?>
+<file path=ppt/slides/slide2.xml><?xml version="1.0" encoding="utf-8"?>
 <p:sld xmlns:p="http://schemas.openxmlformats.org/presentationml/2006/main" xmlns:a="http://schemas.openxmlformats.org/drawingml/2006/main" xmlns:r="http://schemas.openxmlformats.org/officeDocument/2006/relationships">
   <p:cSld>
     <p:bg>
@@ -4434,8 +3579,8 @@
         </p:nvSpPr>
         <p:spPr>
           <a:xfrm rot="0">
-            <a:off x="9144000" y="-238537"/>
-            <a:ext cx="9467850" cy="4991100"/>
+            <a:off x="-507744" y="-719806"/>
+            <a:ext cx="12630839" cy="11726613"/>
           </a:xfrm>
           <a:prstGeom prst="rect">
             <a:avLst/>
@@ -4445,9 +3590,288 @@
           </a:solidFill>
         </p:spPr>
       </p:sp>
+      <p:sp>
+        <p:nvSpPr>
+          <p:cNvPr name="AutoShape 3" id="3"/>
+          <p:cNvSpPr/>
+          <p:nvPr/>
+        </p:nvSpPr>
+        <p:spPr>
+          <a:xfrm rot="0">
+            <a:off x="-78368" y="8891825"/>
+            <a:ext cx="16230600" cy="0"/>
+          </a:xfrm>
+          <a:prstGeom prst="line">
+            <a:avLst/>
+          </a:prstGeom>
+          <a:ln cap="rnd" w="114300">
+            <a:solidFill>
+              <a:srgbClr val="40C6CC"/>
+            </a:solidFill>
+            <a:prstDash val="solid"/>
+            <a:headEnd type="none" len="sm" w="sm"/>
+            <a:tailEnd type="none" len="sm" w="sm"/>
+          </a:ln>
+        </p:spPr>
+      </p:sp>
+      <p:sp>
+        <p:nvSpPr>
+          <p:cNvPr name="AutoShape 4" id="4"/>
+          <p:cNvSpPr/>
+          <p:nvPr/>
+        </p:nvSpPr>
+        <p:spPr>
+          <a:xfrm rot="0">
+            <a:off x="-27189" y="789415"/>
+            <a:ext cx="16230600" cy="0"/>
+          </a:xfrm>
+          <a:prstGeom prst="line">
+            <a:avLst/>
+          </a:prstGeom>
+          <a:ln cap="rnd" w="95250">
+            <a:solidFill>
+              <a:srgbClr val="40C6CC"/>
+            </a:solidFill>
+            <a:prstDash val="solid"/>
+            <a:headEnd type="none" len="sm" w="sm"/>
+            <a:tailEnd type="none" len="sm" w="sm"/>
+          </a:ln>
+        </p:spPr>
+      </p:sp>
       <p:pic>
         <p:nvPicPr>
-          <p:cNvPr name="Picture 3" id="3"/>
+          <p:cNvPr name="Picture 5" id="5"/>
+          <p:cNvPicPr>
+            <a:picLocks noChangeAspect="true"/>
+          </p:cNvPicPr>
+          <p:nvPr/>
+        </p:nvPicPr>
+        <p:blipFill>
+          <a:blip r:embed="rId2"/>
+          <a:srcRect l="712" t="0" r="11394" b="1360"/>
+          <a:stretch>
+            <a:fillRect/>
+          </a:stretch>
+        </p:blipFill>
+        <p:spPr>
+          <a:xfrm flipH="false" flipV="false" rot="0">
+            <a:off x="12123095" y="24670"/>
+            <a:ext cx="6078127" cy="10262330"/>
+          </a:xfrm>
+          <a:prstGeom prst="rect">
+            <a:avLst/>
+          </a:prstGeom>
+        </p:spPr>
+      </p:pic>
+      <p:grpSp>
+        <p:nvGrpSpPr>
+          <p:cNvPr name="Group 6" id="6"/>
+          <p:cNvGrpSpPr/>
+          <p:nvPr/>
+        </p:nvGrpSpPr>
+        <p:grpSpPr>
+          <a:xfrm rot="0">
+            <a:off x="1435117" y="1490694"/>
+            <a:ext cx="8633316" cy="6309311"/>
+            <a:chOff x="0" y="0"/>
+            <a:chExt cx="11511088" cy="8412415"/>
+          </a:xfrm>
+        </p:grpSpPr>
+        <p:sp>
+          <p:nvSpPr>
+            <p:cNvPr name="TextBox 7" id="7"/>
+            <p:cNvSpPr txBox="true"/>
+            <p:nvPr/>
+          </p:nvSpPr>
+          <p:spPr>
+            <a:xfrm rot="0">
+              <a:off x="0" y="26458"/>
+              <a:ext cx="11511088" cy="1393825"/>
+            </a:xfrm>
+            <a:prstGeom prst="rect">
+              <a:avLst/>
+            </a:prstGeom>
+          </p:spPr>
+          <p:txBody>
+            <a:bodyPr anchor="t" rtlCol="false" tIns="0" lIns="0" bIns="0" rIns="0">
+              <a:spAutoFit/>
+            </a:bodyPr>
+            <a:lstStyle/>
+            <a:p>
+              <a:pPr algn="l">
+                <a:lnSpc>
+                  <a:spcPts val="8050"/>
+                </a:lnSpc>
+              </a:pPr>
+              <a:r>
+                <a:rPr lang="en-US" sz="6999">
+                  <a:solidFill>
+                    <a:srgbClr val="231F1D"/>
+                  </a:solidFill>
+                  <a:latin typeface="Montserrat Semi-Bold"/>
+                </a:rPr>
+                <a:t>ОБ ИГРЕ</a:t>
+              </a:r>
+            </a:p>
+          </p:txBody>
+        </p:sp>
+        <p:sp>
+          <p:nvSpPr>
+            <p:cNvPr name="TextBox 8" id="8"/>
+            <p:cNvSpPr txBox="true"/>
+            <p:nvPr/>
+          </p:nvSpPr>
+          <p:spPr>
+            <a:xfrm rot="0">
+              <a:off x="0" y="1884154"/>
+              <a:ext cx="10912891" cy="669290"/>
+            </a:xfrm>
+            <a:prstGeom prst="rect">
+              <a:avLst/>
+            </a:prstGeom>
+          </p:spPr>
+          <p:txBody>
+            <a:bodyPr anchor="t" rtlCol="false" tIns="0" lIns="0" bIns="0" rIns="0">
+              <a:spAutoFit/>
+            </a:bodyPr>
+            <a:lstStyle/>
+            <a:p>
+              <a:pPr algn="l">
+                <a:lnSpc>
+                  <a:spcPts val="4000"/>
+                </a:lnSpc>
+              </a:pPr>
+            </a:p>
+          </p:txBody>
+        </p:sp>
+        <p:sp>
+          <p:nvSpPr>
+            <p:cNvPr name="TextBox 9" id="9"/>
+            <p:cNvSpPr txBox="true"/>
+            <p:nvPr/>
+          </p:nvSpPr>
+          <p:spPr>
+            <a:xfrm rot="0">
+              <a:off x="0" y="2701859"/>
+              <a:ext cx="10853744" cy="5967731"/>
+            </a:xfrm>
+            <a:prstGeom prst="rect">
+              <a:avLst/>
+            </a:prstGeom>
+          </p:spPr>
+          <p:txBody>
+            <a:bodyPr anchor="t" rtlCol="false" tIns="0" lIns="0" bIns="0" rIns="0">
+              <a:spAutoFit/>
+            </a:bodyPr>
+            <a:lstStyle/>
+            <a:p>
+              <a:pPr>
+                <a:lnSpc>
+                  <a:spcPts val="5099"/>
+                </a:lnSpc>
+              </a:pPr>
+              <a:r>
+                <a:rPr lang="en-US" sz="3399" spc="169">
+                  <a:solidFill>
+                    <a:srgbClr val="231F1D"/>
+                  </a:solidFill>
+                  <a:latin typeface="Montserrat Semi-Bold"/>
+                </a:rPr>
+                <a:t>Цель игры обойти все препятствия, найти инопланетную руду и вернуться живым на корабль. </a:t>
+              </a:r>
+            </a:p>
+            <a:p>
+              <a:pPr algn="l">
+                <a:lnSpc>
+                  <a:spcPts val="5099"/>
+                </a:lnSpc>
+              </a:pPr>
+              <a:r>
+                <a:rPr lang="en-US" sz="3399" spc="169">
+                  <a:solidFill>
+                    <a:srgbClr val="231F1D"/>
+                  </a:solidFill>
+                  <a:latin typeface="Montserrat Semi-Bold"/>
+                </a:rPr>
+                <a:t>На пути к цели могут встретиться препятствия в виде лавовых озер.</a:t>
+              </a:r>
+            </a:p>
+          </p:txBody>
+        </p:sp>
+      </p:grpSp>
+      <p:sp>
+        <p:nvSpPr>
+          <p:cNvPr name="TextBox 10" id="10"/>
+          <p:cNvSpPr txBox="true"/>
+          <p:nvPr/>
+        </p:nvSpPr>
+        <p:spPr>
+          <a:xfrm rot="0">
+            <a:off x="5751775" y="9702174"/>
+            <a:ext cx="11909119" cy="287655"/>
+          </a:xfrm>
+          <a:prstGeom prst="rect">
+            <a:avLst/>
+          </a:prstGeom>
+        </p:spPr>
+        <p:txBody>
+          <a:bodyPr anchor="t" rtlCol="false" tIns="0" lIns="0" bIns="0" rIns="0">
+            <a:spAutoFit/>
+          </a:bodyPr>
+          <a:lstStyle/>
+          <a:p>
+            <a:pPr algn="r">
+              <a:lnSpc>
+                <a:spcPts val="2379"/>
+              </a:lnSpc>
+            </a:pPr>
+            <a:r>
+              <a:rPr lang="en-US" sz="1700" spc="170">
+                <a:solidFill>
+                  <a:srgbClr val="231F1D"/>
+                </a:solidFill>
+                <a:latin typeface="Montserrat Semi-Bold"/>
+              </a:rPr>
+              <a:t>ФД Лето 2020</a:t>
+            </a:r>
+          </a:p>
+        </p:txBody>
+      </p:sp>
+    </p:spTree>
+  </p:cSld>
+  <p:clrMapOvr>
+    <a:masterClrMapping/>
+  </p:clrMapOvr>
+</p:sld>
+</file>
+
+<file path=ppt/slides/slide3.xml><?xml version="1.0" encoding="utf-8"?>
+<p:sld xmlns:p="http://schemas.openxmlformats.org/presentationml/2006/main" xmlns:a="http://schemas.openxmlformats.org/drawingml/2006/main" xmlns:r="http://schemas.openxmlformats.org/officeDocument/2006/relationships">
+  <p:cSld>
+    <p:bg>
+      <p:bgPr>
+        <a:solidFill>
+          <a:srgbClr val="231F1D"/>
+        </a:solidFill>
+      </p:bgPr>
+    </p:bg>
+    <p:spTree>
+      <p:nvGrpSpPr>
+        <p:cNvPr id="1" name=""/>
+        <p:cNvGrpSpPr/>
+        <p:nvPr/>
+      </p:nvGrpSpPr>
+      <p:grpSpPr>
+        <a:xfrm>
+          <a:off x="0" y="0"/>
+          <a:ext cx="0" cy="0"/>
+          <a:chOff x="0" y="0"/>
+          <a:chExt cx="0" cy="0"/>
+        </a:xfrm>
+      </p:grpSpPr>
+      <p:pic>
+        <p:nvPicPr>
+          <p:cNvPr name="Picture 2" id="2"/>
           <p:cNvPicPr>
             <a:picLocks noChangeAspect="true"/>
           </p:cNvPicPr>
@@ -4462,8 +3886,8 @@
         </p:blipFill>
         <p:spPr>
           <a:xfrm flipH="false" flipV="false" rot="0">
-            <a:off x="0" y="0"/>
-            <a:ext cx="9144000" cy="740950"/>
+            <a:off x="1028700" y="0"/>
+            <a:ext cx="7156174" cy="10287000"/>
           </a:xfrm>
           <a:prstGeom prst="rect">
             <a:avLst/>
@@ -4472,7 +3896,7 @@
       </p:pic>
       <p:pic>
         <p:nvPicPr>
-          <p:cNvPr name="Picture 4" id="4"/>
+          <p:cNvPr name="Picture 3" id="3"/>
           <p:cNvPicPr>
             <a:picLocks noChangeAspect="true"/>
           </p:cNvPicPr>
@@ -4487,6 +3911,145 @@
         </p:blipFill>
         <p:spPr>
           <a:xfrm flipH="false" flipV="false" rot="0">
+            <a:off x="10115905" y="0"/>
+            <a:ext cx="7143395" cy="10287000"/>
+          </a:xfrm>
+          <a:prstGeom prst="rect">
+            <a:avLst/>
+          </a:prstGeom>
+        </p:spPr>
+      </p:pic>
+      <p:sp>
+        <p:nvSpPr>
+          <p:cNvPr name="TextBox 4" id="4"/>
+          <p:cNvSpPr txBox="true"/>
+          <p:nvPr/>
+        </p:nvSpPr>
+        <p:spPr>
+          <a:xfrm rot="0">
+            <a:off x="5751775" y="9702174"/>
+            <a:ext cx="11909119" cy="287655"/>
+          </a:xfrm>
+          <a:prstGeom prst="rect">
+            <a:avLst/>
+          </a:prstGeom>
+        </p:spPr>
+        <p:txBody>
+          <a:bodyPr anchor="t" rtlCol="false" tIns="0" lIns="0" bIns="0" rIns="0">
+            <a:spAutoFit/>
+          </a:bodyPr>
+          <a:lstStyle/>
+          <a:p>
+            <a:pPr algn="r">
+              <a:lnSpc>
+                <a:spcPts val="2379"/>
+              </a:lnSpc>
+            </a:pPr>
+            <a:r>
+              <a:rPr lang="en-US" sz="1700" spc="170">
+                <a:solidFill>
+                  <a:srgbClr val="231F1D"/>
+                </a:solidFill>
+                <a:latin typeface="Montserrat Semi-Bold"/>
+              </a:rPr>
+              <a:t>ФД Лето 2020</a:t>
+            </a:r>
+          </a:p>
+        </p:txBody>
+      </p:sp>
+    </p:spTree>
+  </p:cSld>
+  <p:clrMapOvr>
+    <a:masterClrMapping/>
+  </p:clrMapOvr>
+</p:sld>
+</file>
+
+<file path=ppt/slides/slide4.xml><?xml version="1.0" encoding="utf-8"?>
+<p:sld xmlns:p="http://schemas.openxmlformats.org/presentationml/2006/main" xmlns:a="http://schemas.openxmlformats.org/drawingml/2006/main" xmlns:r="http://schemas.openxmlformats.org/officeDocument/2006/relationships">
+  <p:cSld>
+    <p:bg>
+      <p:bgPr>
+        <a:solidFill>
+          <a:srgbClr val="231F1D"/>
+        </a:solidFill>
+      </p:bgPr>
+    </p:bg>
+    <p:spTree>
+      <p:nvGrpSpPr>
+        <p:cNvPr id="1" name=""/>
+        <p:cNvGrpSpPr/>
+        <p:nvPr/>
+      </p:nvGrpSpPr>
+      <p:grpSpPr>
+        <a:xfrm>
+          <a:off x="0" y="0"/>
+          <a:ext cx="0" cy="0"/>
+          <a:chOff x="0" y="0"/>
+          <a:chExt cx="0" cy="0"/>
+        </a:xfrm>
+      </p:grpSpPr>
+      <p:sp>
+        <p:nvSpPr>
+          <p:cNvPr name="AutoShape 2" id="2"/>
+          <p:cNvSpPr/>
+          <p:nvPr/>
+        </p:nvSpPr>
+        <p:spPr>
+          <a:xfrm rot="0">
+            <a:off x="9144000" y="-238537"/>
+            <a:ext cx="9467850" cy="3880348"/>
+          </a:xfrm>
+          <a:prstGeom prst="rect">
+            <a:avLst/>
+          </a:prstGeom>
+          <a:solidFill>
+            <a:srgbClr val="F7F9F8"/>
+          </a:solidFill>
+        </p:spPr>
+      </p:sp>
+      <p:pic>
+        <p:nvPicPr>
+          <p:cNvPr name="Picture 3" id="3"/>
+          <p:cNvPicPr>
+            <a:picLocks noChangeAspect="true"/>
+          </p:cNvPicPr>
+          <p:nvPr/>
+        </p:nvPicPr>
+        <p:blipFill>
+          <a:blip r:embed="rId2"/>
+          <a:srcRect l="0" t="0" r="0" b="0"/>
+          <a:stretch>
+            <a:fillRect/>
+          </a:stretch>
+        </p:blipFill>
+        <p:spPr>
+          <a:xfrm flipH="false" flipV="false" rot="0">
+            <a:off x="0" y="0"/>
+            <a:ext cx="9144000" cy="740950"/>
+          </a:xfrm>
+          <a:prstGeom prst="rect">
+            <a:avLst/>
+          </a:prstGeom>
+        </p:spPr>
+      </p:pic>
+      <p:pic>
+        <p:nvPicPr>
+          <p:cNvPr name="Picture 4" id="4"/>
+          <p:cNvPicPr>
+            <a:picLocks noChangeAspect="true"/>
+          </p:cNvPicPr>
+          <p:nvPr/>
+        </p:nvPicPr>
+        <p:blipFill>
+          <a:blip r:embed="rId3"/>
+          <a:srcRect l="0" t="0" r="0" b="0"/>
+          <a:stretch>
+            <a:fillRect/>
+          </a:stretch>
+        </p:blipFill>
+        <p:spPr>
+          <a:xfrm flipH="false" flipV="false" rot="0">
             <a:off x="0" y="740950"/>
             <a:ext cx="9144000" cy="831273"/>
           </a:xfrm>
@@ -4595,16 +4158,71 @@
           </a:prstGeom>
         </p:spPr>
       </p:pic>
-      <p:sp>
-        <p:nvSpPr>
-          <p:cNvPr name="AutoShape 9" id="9"/>
+      <p:grpSp>
+        <p:nvGrpSpPr>
+          <p:cNvPr name="Group 9" id="9"/>
+          <p:cNvGrpSpPr/>
+          <p:nvPr/>
+        </p:nvGrpSpPr>
+        <p:grpSpPr>
+          <a:xfrm rot="0">
+            <a:off x="-2488488" y="-514350"/>
+            <a:ext cx="5657850" cy="5657850"/>
+            <a:chOff x="0" y="0"/>
+            <a:chExt cx="1913890" cy="1913890"/>
+          </a:xfrm>
+        </p:grpSpPr>
+        <p:sp>
+          <p:nvSpPr>
+            <p:cNvPr name="Freeform 10" id="10"/>
+            <p:cNvSpPr/>
+            <p:nvPr/>
+          </p:nvSpPr>
+          <p:spPr>
+            <a:xfrm>
+              <a:off x="0" y="0"/>
+              <a:ext cx="1913890" cy="1913890"/>
+            </a:xfrm>
+            <a:custGeom>
+              <a:avLst/>
+              <a:gdLst/>
+              <a:ahLst/>
+              <a:cxnLst/>
+              <a:rect r="r" b="b" t="t" l="l"/>
+              <a:pathLst>
+                <a:path h="1913890" w="1913890">
+                  <a:moveTo>
+                    <a:pt x="0" y="0"/>
+                  </a:moveTo>
+                  <a:lnTo>
+                    <a:pt x="1913890" y="0"/>
+                  </a:lnTo>
+                  <a:lnTo>
+                    <a:pt x="1913890" y="1913890"/>
+                  </a:lnTo>
+                  <a:lnTo>
+                    <a:pt x="0" y="1913890"/>
+                  </a:lnTo>
+                  <a:close/>
+                </a:path>
+              </a:pathLst>
+            </a:custGeom>
+            <a:solidFill>
+              <a:srgbClr val="000000"/>
+            </a:solidFill>
+          </p:spPr>
+        </p:sp>
+      </p:grpSp>
+      <p:sp>
+        <p:nvSpPr>
+          <p:cNvPr name="AutoShape 11" id="11"/>
           <p:cNvSpPr/>
           <p:nvPr/>
         </p:nvSpPr>
         <p:spPr>
           <a:xfrm rot="0">
-            <a:off x="-323850" y="4714463"/>
-            <a:ext cx="9467850" cy="4991100"/>
+            <a:off x="-323850" y="3641811"/>
+            <a:ext cx="13867211" cy="6063752"/>
           </a:xfrm>
           <a:prstGeom prst="rect">
             <a:avLst/>
@@ -4614,9 +4232,64 @@
           </a:solidFill>
         </p:spPr>
       </p:sp>
-      <p:sp>
-        <p:nvSpPr>
-          <p:cNvPr name="AutoShape 10" id="10"/>
+      <p:grpSp>
+        <p:nvGrpSpPr>
+          <p:cNvPr name="Group 12" id="12"/>
+          <p:cNvGrpSpPr/>
+          <p:nvPr/>
+        </p:nvGrpSpPr>
+        <p:grpSpPr>
+          <a:xfrm rot="0">
+            <a:off x="3045174" y="3641811"/>
+            <a:ext cx="496751" cy="6238359"/>
+            <a:chOff x="0" y="0"/>
+            <a:chExt cx="152400" cy="1913890"/>
+          </a:xfrm>
+        </p:grpSpPr>
+        <p:sp>
+          <p:nvSpPr>
+            <p:cNvPr name="Freeform 13" id="13"/>
+            <p:cNvSpPr/>
+            <p:nvPr/>
+          </p:nvSpPr>
+          <p:spPr>
+            <a:xfrm>
+              <a:off x="0" y="0"/>
+              <a:ext cx="152400" cy="1913890"/>
+            </a:xfrm>
+            <a:custGeom>
+              <a:avLst/>
+              <a:gdLst/>
+              <a:ahLst/>
+              <a:cxnLst/>
+              <a:rect r="r" b="b" t="t" l="l"/>
+              <a:pathLst>
+                <a:path h="1913890" w="152400">
+                  <a:moveTo>
+                    <a:pt x="0" y="0"/>
+                  </a:moveTo>
+                  <a:lnTo>
+                    <a:pt x="152400" y="0"/>
+                  </a:lnTo>
+                  <a:lnTo>
+                    <a:pt x="152400" y="1913890"/>
+                  </a:lnTo>
+                  <a:lnTo>
+                    <a:pt x="0" y="1913890"/>
+                  </a:lnTo>
+                  <a:close/>
+                </a:path>
+              </a:pathLst>
+            </a:custGeom>
+            <a:solidFill>
+              <a:srgbClr val="40C6CC"/>
+            </a:solidFill>
+          </p:spPr>
+        </p:sp>
+      </p:grpSp>
+      <p:sp>
+        <p:nvSpPr>
+          <p:cNvPr name="AutoShape 14" id="14"/>
           <p:cNvSpPr/>
           <p:nvPr/>
         </p:nvSpPr>
@@ -4633,30 +4306,228 @@
           </a:solidFill>
         </p:spPr>
       </p:sp>
+      <p:sp>
+        <p:nvSpPr>
+          <p:cNvPr name="AutoShape 15" id="15"/>
+          <p:cNvSpPr/>
+          <p:nvPr/>
+        </p:nvSpPr>
+        <p:spPr>
+          <a:xfrm rot="0">
+            <a:off x="-323850" y="3641811"/>
+            <a:ext cx="16230600" cy="0"/>
+          </a:xfrm>
+          <a:prstGeom prst="line">
+            <a:avLst/>
+          </a:prstGeom>
+          <a:ln cap="rnd" w="323850">
+            <a:solidFill>
+              <a:srgbClr val="40C6CC"/>
+            </a:solidFill>
+            <a:prstDash val="solid"/>
+            <a:headEnd type="none" len="sm" w="sm"/>
+            <a:tailEnd type="none" len="sm" w="sm"/>
+          </a:ln>
+        </p:spPr>
+      </p:sp>
+      <p:pic>
+        <p:nvPicPr>
+          <p:cNvPr name="Picture 16" id="16"/>
+          <p:cNvPicPr>
+            <a:picLocks noChangeAspect="true"/>
+          </p:cNvPicPr>
+          <p:nvPr/>
+        </p:nvPicPr>
+        <p:blipFill>
+          <a:blip r:embed="rId8"/>
+          <a:srcRect l="0" t="0" r="1076" b="0"/>
+          <a:stretch>
+            <a:fillRect/>
+          </a:stretch>
+        </p:blipFill>
+        <p:spPr>
+          <a:xfrm flipH="false" flipV="false" rot="0">
+            <a:off x="12971906" y="3641811"/>
+            <a:ext cx="5316094" cy="6645189"/>
+          </a:xfrm>
+          <a:prstGeom prst="rect">
+            <a:avLst/>
+          </a:prstGeom>
+        </p:spPr>
+      </p:pic>
+      <p:sp>
+        <p:nvSpPr>
+          <p:cNvPr name="AutoShape 17" id="17"/>
+          <p:cNvSpPr/>
+          <p:nvPr/>
+        </p:nvSpPr>
+        <p:spPr>
+          <a:xfrm rot="5400000">
+            <a:off x="7204080" y="1701891"/>
+            <a:ext cx="4041766" cy="0"/>
+          </a:xfrm>
+          <a:prstGeom prst="line">
+            <a:avLst/>
+          </a:prstGeom>
+          <a:ln cap="rnd" w="161925">
+            <a:solidFill>
+              <a:srgbClr val="40C6CC"/>
+            </a:solidFill>
+            <a:prstDash val="solid"/>
+            <a:headEnd type="none" len="sm" w="sm"/>
+            <a:tailEnd type="none" len="sm" w="sm"/>
+          </a:ln>
+        </p:spPr>
+      </p:sp>
+      <p:pic>
+        <p:nvPicPr>
+          <p:cNvPr name="Picture 18" id="18"/>
+          <p:cNvPicPr>
+            <a:picLocks noChangeAspect="true"/>
+          </p:cNvPicPr>
+          <p:nvPr/>
+        </p:nvPicPr>
+        <p:blipFill>
+          <a:blip r:embed="rId9"/>
+          <a:srcRect l="0" t="0" r="0" b="0"/>
+          <a:stretch>
+            <a:fillRect/>
+          </a:stretch>
+        </p:blipFill>
+        <p:spPr>
+          <a:xfrm flipH="false" flipV="false" rot="0">
+            <a:off x="0" y="0"/>
+            <a:ext cx="3293550" cy="673681"/>
+          </a:xfrm>
+          <a:prstGeom prst="rect">
+            <a:avLst/>
+          </a:prstGeom>
+        </p:spPr>
+      </p:pic>
+      <p:pic>
+        <p:nvPicPr>
+          <p:cNvPr name="Picture 19" id="19"/>
+          <p:cNvPicPr>
+            <a:picLocks noChangeAspect="true"/>
+          </p:cNvPicPr>
+          <p:nvPr/>
+        </p:nvPicPr>
+        <p:blipFill>
+          <a:blip r:embed="rId9"/>
+          <a:srcRect l="3671" t="0" r="7165" b="0"/>
+          <a:stretch>
+            <a:fillRect/>
+          </a:stretch>
+        </p:blipFill>
+        <p:spPr>
+          <a:xfrm flipH="false" flipV="false" rot="0">
+            <a:off x="0" y="778805"/>
+            <a:ext cx="3169362" cy="727075"/>
+          </a:xfrm>
+          <a:prstGeom prst="rect">
+            <a:avLst/>
+          </a:prstGeom>
+        </p:spPr>
+      </p:pic>
+      <p:pic>
+        <p:nvPicPr>
+          <p:cNvPr name="Picture 20" id="20"/>
+          <p:cNvPicPr>
+            <a:picLocks noChangeAspect="true"/>
+          </p:cNvPicPr>
+          <p:nvPr/>
+        </p:nvPicPr>
+        <p:blipFill>
+          <a:blip r:embed="rId9"/>
+          <a:srcRect l="0" t="0" r="0" b="0"/>
+          <a:stretch>
+            <a:fillRect/>
+          </a:stretch>
+        </p:blipFill>
+        <p:spPr>
+          <a:xfrm flipH="false" flipV="false" rot="0">
+            <a:off x="-88480" y="1550468"/>
+            <a:ext cx="3382029" cy="691779"/>
+          </a:xfrm>
+          <a:prstGeom prst="rect">
+            <a:avLst/>
+          </a:prstGeom>
+        </p:spPr>
+      </p:pic>
+      <p:pic>
+        <p:nvPicPr>
+          <p:cNvPr name="Picture 21" id="21"/>
+          <p:cNvPicPr>
+            <a:picLocks noChangeAspect="true"/>
+          </p:cNvPicPr>
+          <p:nvPr/>
+        </p:nvPicPr>
+        <p:blipFill>
+          <a:blip r:embed="rId9"/>
+          <a:srcRect l="0" t="0" r="4990" b="0"/>
+          <a:stretch>
+            <a:fillRect/>
+          </a:stretch>
+        </p:blipFill>
+        <p:spPr>
+          <a:xfrm flipH="false" flipV="false" rot="0">
+            <a:off x="0" y="2302660"/>
+            <a:ext cx="3307389" cy="712048"/>
+          </a:xfrm>
+          <a:prstGeom prst="rect">
+            <a:avLst/>
+          </a:prstGeom>
+        </p:spPr>
+      </p:pic>
+      <p:pic>
+        <p:nvPicPr>
+          <p:cNvPr name="Picture 22" id="22"/>
+          <p:cNvPicPr>
+            <a:picLocks noChangeAspect="true"/>
+          </p:cNvPicPr>
+          <p:nvPr/>
+        </p:nvPicPr>
+        <p:blipFill>
+          <a:blip r:embed="rId9"/>
+          <a:srcRect l="0" t="0" r="0" b="0"/>
+          <a:stretch>
+            <a:fillRect/>
+          </a:stretch>
+        </p:blipFill>
+        <p:spPr>
+          <a:xfrm flipH="false" flipV="false" rot="0">
+            <a:off x="0" y="2969061"/>
+            <a:ext cx="3288999" cy="672750"/>
+          </a:xfrm>
+          <a:prstGeom prst="rect">
+            <a:avLst/>
+          </a:prstGeom>
+        </p:spPr>
+      </p:pic>
       <p:grpSp>
         <p:nvGrpSpPr>
-          <p:cNvPr name="Group 11" id="11"/>
+          <p:cNvPr name="Group 23" id="23"/>
           <p:cNvGrpSpPr/>
           <p:nvPr/>
         </p:nvGrpSpPr>
         <p:grpSpPr>
           <a:xfrm rot="0">
-            <a:off x="1009427" y="6008661"/>
-            <a:ext cx="7086518" cy="2174103"/>
+            <a:off x="4248191" y="5726224"/>
+            <a:ext cx="7086518" cy="2476363"/>
             <a:chOff x="0" y="0"/>
-            <a:chExt cx="9448691" cy="2898804"/>
+            <a:chExt cx="9448691" cy="3301817"/>
           </a:xfrm>
         </p:grpSpPr>
         <p:sp>
           <p:nvSpPr>
-            <p:cNvPr name="TextBox 12" id="12"/>
+            <p:cNvPr name="TextBox 24" id="24"/>
             <p:cNvSpPr txBox="true"/>
             <p:nvPr/>
           </p:nvSpPr>
           <p:spPr>
             <a:xfrm rot="0">
-              <a:off x="11402" y="-21167"/>
-              <a:ext cx="9425887" cy="1885950"/>
+              <a:off x="11402" y="-30692"/>
+              <a:ext cx="9425887" cy="2298488"/>
             </a:xfrm>
             <a:prstGeom prst="rect">
               <a:avLst/>
@@ -4670,11 +4541,11 @@
             <a:p>
               <a:pPr algn="ctr">
                 <a:lnSpc>
-                  <a:spcPts val="5625"/>
+                  <a:spcPts val="6874"/>
                 </a:lnSpc>
               </a:pPr>
               <a:r>
-                <a:rPr lang="en-US" sz="4500" spc="157">
+                <a:rPr lang="en-US" sz="5499" spc="192">
                   <a:solidFill>
                     <a:srgbClr val="231F1D"/>
                   </a:solidFill>
@@ -4687,13 +4558,13 @@
         </p:sp>
         <p:sp>
           <p:nvSpPr>
-            <p:cNvPr name="TextBox 13" id="13"/>
+            <p:cNvPr name="TextBox 25" id="25"/>
             <p:cNvSpPr txBox="true"/>
             <p:nvPr/>
           </p:nvSpPr>
           <p:spPr>
             <a:xfrm rot="0">
-              <a:off x="0" y="2346565"/>
+              <a:off x="0" y="2749579"/>
               <a:ext cx="9448691" cy="365548"/>
             </a:xfrm>
             <a:prstGeom prst="rect">
@@ -4717,28 +4588,28 @@
       </p:grpSp>
       <p:grpSp>
         <p:nvGrpSpPr>
-          <p:cNvPr name="Group 14" id="14"/>
+          <p:cNvPr name="Group 26" id="26"/>
           <p:cNvGrpSpPr/>
           <p:nvPr/>
         </p:nvGrpSpPr>
         <p:grpSpPr>
           <a:xfrm rot="0">
-            <a:off x="10172782" y="1467708"/>
-            <a:ext cx="7086518" cy="2174103"/>
+            <a:off x="9718615" y="658811"/>
+            <a:ext cx="7649492" cy="2475093"/>
             <a:chOff x="0" y="0"/>
-            <a:chExt cx="9448691" cy="2898804"/>
+            <a:chExt cx="10199322" cy="3300124"/>
           </a:xfrm>
         </p:grpSpPr>
         <p:sp>
           <p:nvSpPr>
-            <p:cNvPr name="TextBox 15" id="15"/>
+            <p:cNvPr name="TextBox 27" id="27"/>
             <p:cNvSpPr txBox="true"/>
             <p:nvPr/>
           </p:nvSpPr>
           <p:spPr>
             <a:xfrm rot="0">
-              <a:off x="11402" y="-21167"/>
-              <a:ext cx="9425887" cy="1885950"/>
+              <a:off x="12308" y="-30692"/>
+              <a:ext cx="10174707" cy="2298488"/>
             </a:xfrm>
             <a:prstGeom prst="rect">
               <a:avLst/>
@@ -4752,11 +4623,11 @@
             <a:p>
               <a:pPr algn="ctr">
                 <a:lnSpc>
-                  <a:spcPts val="5625"/>
+                  <a:spcPts val="6874"/>
                 </a:lnSpc>
               </a:pPr>
               <a:r>
-                <a:rPr lang="en-US" sz="4500" spc="157">
+                <a:rPr lang="en-US" sz="5499" spc="192">
                   <a:solidFill>
                     <a:srgbClr val="231F1D"/>
                   </a:solidFill>
@@ -4769,14 +4640,14 @@
         </p:sp>
         <p:sp>
           <p:nvSpPr>
-            <p:cNvPr name="TextBox 16" id="16"/>
+            <p:cNvPr name="TextBox 28" id="28"/>
             <p:cNvSpPr txBox="true"/>
             <p:nvPr/>
           </p:nvSpPr>
           <p:spPr>
             <a:xfrm rot="0">
-              <a:off x="0" y="2346565"/>
-              <a:ext cx="9448691" cy="365548"/>
+              <a:off x="0" y="2749579"/>
+              <a:ext cx="10199322" cy="363855"/>
             </a:xfrm>
             <a:prstGeom prst="rect">
               <a:avLst/>
@@ -4805,7 +4676,7 @@
 </p:sld>
 </file>
 
-<file path=ppt/slides/slide6.xml><?xml version="1.0" encoding="utf-8"?>
+<file path=ppt/slides/slide5.xml><?xml version="1.0" encoding="utf-8"?>
 <p:sld xmlns:p="http://schemas.openxmlformats.org/presentationml/2006/main" xmlns:a="http://schemas.openxmlformats.org/drawingml/2006/main" xmlns:r="http://schemas.openxmlformats.org/officeDocument/2006/relationships">
   <p:cSld>
     <p:bg>
@@ -4831,45 +4702,7 @@
       </p:grpSpPr>
       <p:sp>
         <p:nvSpPr>
-          <p:cNvPr name="TextBox 2" id="2"/>
-          <p:cNvSpPr txBox="true"/>
-          <p:nvPr/>
-        </p:nvSpPr>
-        <p:spPr>
-          <a:xfrm rot="0">
-            <a:off x="667154" y="1491860"/>
-            <a:ext cx="7350106" cy="1979771"/>
-          </a:xfrm>
-          <a:prstGeom prst="rect">
-            <a:avLst/>
-          </a:prstGeom>
-        </p:spPr>
-        <p:txBody>
-          <a:bodyPr anchor="t" rtlCol="false" tIns="0" lIns="0" bIns="0" rIns="0">
-            <a:spAutoFit/>
-          </a:bodyPr>
-          <a:lstStyle/>
-          <a:p>
-            <a:pPr algn="l">
-              <a:lnSpc>
-                <a:spcPts val="7791"/>
-              </a:lnSpc>
-            </a:pPr>
-            <a:r>
-              <a:rPr lang="en-US" sz="6774">
-                <a:solidFill>
-                  <a:srgbClr val="231F1D"/>
-                </a:solidFill>
-                <a:ea typeface="Montserrat Semi-Bold Bold"/>
-              </a:rPr>
-              <a:t>﻿КЛЮЧ ГЕНЕРАЦИИ</a:t>
-            </a:r>
-          </a:p>
-        </p:txBody>
-      </p:sp>
-      <p:sp>
-        <p:nvSpPr>
-          <p:cNvPr name="AutoShape 3" id="3"/>
+          <p:cNvPr name="AutoShape 2" id="2"/>
           <p:cNvSpPr/>
           <p:nvPr/>
         </p:nvSpPr>
@@ -4888,7 +4721,7 @@
       </p:sp>
       <p:sp>
         <p:nvSpPr>
-          <p:cNvPr name="AutoShape 4" id="4"/>
+          <p:cNvPr name="AutoShape 3" id="3"/>
           <p:cNvSpPr/>
           <p:nvPr/>
         </p:nvSpPr>
@@ -4907,7 +4740,7 @@
       </p:sp>
       <p:pic>
         <p:nvPicPr>
-          <p:cNvPr name="Picture 5" id="5"/>
+          <p:cNvPr name="Picture 4" id="4"/>
           <p:cNvPicPr>
             <a:picLocks noChangeAspect="true"/>
           </p:cNvPicPr>
@@ -4924,6 +4757,300 @@
           <a:xfrm flipH="false" flipV="false" rot="0">
             <a:off x="9393209" y="0"/>
             <a:ext cx="6829594" cy="10287000"/>
+          </a:xfrm>
+          <a:prstGeom prst="rect">
+            <a:avLst/>
+          </a:prstGeom>
+        </p:spPr>
+      </p:pic>
+      <p:pic>
+        <p:nvPicPr>
+          <p:cNvPr name="Picture 5" id="5"/>
+          <p:cNvPicPr>
+            <a:picLocks noChangeAspect="true"/>
+          </p:cNvPicPr>
+          <p:nvPr/>
+        </p:nvPicPr>
+        <p:blipFill>
+          <a:blip r:embed="rId3"/>
+          <a:srcRect l="0" t="0" r="0" b="0"/>
+          <a:stretch>
+            <a:fillRect/>
+          </a:stretch>
+        </p:blipFill>
+        <p:spPr>
+          <a:xfrm flipH="false" flipV="false" rot="0">
+            <a:off x="9393209" y="0"/>
+            <a:ext cx="7109944" cy="10287000"/>
+          </a:xfrm>
+          <a:prstGeom prst="rect">
+            <a:avLst/>
+          </a:prstGeom>
+        </p:spPr>
+      </p:pic>
+      <p:sp>
+        <p:nvSpPr>
+          <p:cNvPr name="TextBox 6" id="6"/>
+          <p:cNvSpPr txBox="true"/>
+          <p:nvPr/>
+        </p:nvSpPr>
+        <p:spPr>
+          <a:xfrm rot="0">
+            <a:off x="667154" y="1491860"/>
+            <a:ext cx="7350106" cy="1979771"/>
+          </a:xfrm>
+          <a:prstGeom prst="rect">
+            <a:avLst/>
+          </a:prstGeom>
+        </p:spPr>
+        <p:txBody>
+          <a:bodyPr anchor="t" rtlCol="false" tIns="0" lIns="0" bIns="0" rIns="0">
+            <a:spAutoFit/>
+          </a:bodyPr>
+          <a:lstStyle/>
+          <a:p>
+            <a:pPr algn="l">
+              <a:lnSpc>
+                <a:spcPts val="7791"/>
+              </a:lnSpc>
+            </a:pPr>
+            <a:r>
+              <a:rPr lang="en-US" sz="6774">
+                <a:solidFill>
+                  <a:srgbClr val="231F1D"/>
+                </a:solidFill>
+                <a:ea typeface="Montserrat Semi-Bold Bold"/>
+              </a:rPr>
+              <a:t>﻿КЛЮЧ ГЕНЕРАЦИИ</a:t>
+            </a:r>
+          </a:p>
+        </p:txBody>
+      </p:sp>
+      <p:sp>
+        <p:nvSpPr>
+          <p:cNvPr name="TextBox 7" id="7"/>
+          <p:cNvSpPr txBox="true"/>
+          <p:nvPr/>
+        </p:nvSpPr>
+        <p:spPr>
+          <a:xfrm rot="0">
+            <a:off x="1175875" y="4561205"/>
+            <a:ext cx="6079772" cy="1879355"/>
+          </a:xfrm>
+          <a:prstGeom prst="rect">
+            <a:avLst/>
+          </a:prstGeom>
+        </p:spPr>
+        <p:txBody>
+          <a:bodyPr anchor="t" rtlCol="false" tIns="0" lIns="0" bIns="0" rIns="0">
+            <a:spAutoFit/>
+          </a:bodyPr>
+          <a:lstStyle/>
+          <a:p>
+            <a:pPr algn="ctr">
+              <a:lnSpc>
+                <a:spcPts val="5053"/>
+              </a:lnSpc>
+            </a:pPr>
+            <a:r>
+              <a:rPr lang="en-US" sz="3609">
+                <a:solidFill>
+                  <a:srgbClr val="231F1D"/>
+                </a:solidFill>
+                <a:latin typeface="Montserrat Semi-Bold"/>
+              </a:rPr>
+              <a:t>Этот метод был</a:t>
+            </a:r>
+          </a:p>
+          <a:p>
+            <a:pPr algn="ctr">
+              <a:lnSpc>
+                <a:spcPts val="5053"/>
+              </a:lnSpc>
+            </a:pPr>
+            <a:r>
+              <a:rPr lang="en-US" sz="3609">
+                <a:solidFill>
+                  <a:srgbClr val="231F1D"/>
+                </a:solidFill>
+                <a:latin typeface="Montserrat Semi-Bold"/>
+              </a:rPr>
+              <a:t> разработан специально</a:t>
+            </a:r>
+          </a:p>
+          <a:p>
+            <a:pPr algn="ctr">
+              <a:lnSpc>
+                <a:spcPts val="5053"/>
+              </a:lnSpc>
+            </a:pPr>
+            <a:r>
+              <a:rPr lang="en-US" sz="3609">
+                <a:solidFill>
+                  <a:srgbClr val="231F1D"/>
+                </a:solidFill>
+                <a:latin typeface="Montserrat Semi-Bold"/>
+              </a:rPr>
+              <a:t> для этого проекта</a:t>
+            </a:r>
+          </a:p>
+        </p:txBody>
+      </p:sp>
+    </p:spTree>
+  </p:cSld>
+  <p:clrMapOvr>
+    <a:masterClrMapping/>
+  </p:clrMapOvr>
+</p:sld>
+</file>
+
+<file path=ppt/slides/slide6.xml><?xml version="1.0" encoding="utf-8"?>
+<p:sld xmlns:p="http://schemas.openxmlformats.org/presentationml/2006/main" xmlns:a="http://schemas.openxmlformats.org/drawingml/2006/main" xmlns:r="http://schemas.openxmlformats.org/officeDocument/2006/relationships">
+  <p:cSld>
+    <p:bg>
+      <p:bgPr>
+        <a:solidFill>
+          <a:srgbClr val="231F1D"/>
+        </a:solidFill>
+      </p:bgPr>
+    </p:bg>
+    <p:spTree>
+      <p:nvGrpSpPr>
+        <p:cNvPr id="1" name=""/>
+        <p:cNvGrpSpPr/>
+        <p:nvPr/>
+      </p:nvGrpSpPr>
+      <p:grpSpPr>
+        <a:xfrm>
+          <a:off x="0" y="0"/>
+          <a:ext cx="0" cy="0"/>
+          <a:chOff x="0" y="0"/>
+          <a:chExt cx="0" cy="0"/>
+        </a:xfrm>
+      </p:grpSpPr>
+      <p:grpSp>
+        <p:nvGrpSpPr>
+          <p:cNvPr name="Group 2" id="2"/>
+          <p:cNvGrpSpPr/>
+          <p:nvPr/>
+        </p:nvGrpSpPr>
+        <p:grpSpPr>
+          <a:xfrm rot="0">
+            <a:off x="0" y="9258300"/>
+            <a:ext cx="18288000" cy="551390"/>
+            <a:chOff x="0" y="0"/>
+            <a:chExt cx="5054663" cy="152400"/>
+          </a:xfrm>
+        </p:grpSpPr>
+        <p:sp>
+          <p:nvSpPr>
+            <p:cNvPr name="Freeform 3" id="3"/>
+            <p:cNvSpPr/>
+            <p:nvPr/>
+          </p:nvSpPr>
+          <p:spPr>
+            <a:xfrm>
+              <a:off x="0" y="0"/>
+              <a:ext cx="5054664" cy="152400"/>
+            </a:xfrm>
+            <a:custGeom>
+              <a:avLst/>
+              <a:gdLst/>
+              <a:ahLst/>
+              <a:cxnLst/>
+              <a:rect r="r" b="b" t="t" l="l"/>
+              <a:pathLst>
+                <a:path h="152400" w="5054664">
+                  <a:moveTo>
+                    <a:pt x="0" y="0"/>
+                  </a:moveTo>
+                  <a:lnTo>
+                    <a:pt x="5054664" y="0"/>
+                  </a:lnTo>
+                  <a:lnTo>
+                    <a:pt x="5054664" y="152400"/>
+                  </a:lnTo>
+                  <a:lnTo>
+                    <a:pt x="0" y="152400"/>
+                  </a:lnTo>
+                  <a:close/>
+                </a:path>
+              </a:pathLst>
+            </a:custGeom>
+            <a:solidFill>
+              <a:srgbClr val="40C6CC"/>
+            </a:solidFill>
+          </p:spPr>
+        </p:sp>
+      </p:grpSp>
+      <p:sp>
+        <p:nvSpPr>
+          <p:cNvPr name="AutoShape 4" id="4"/>
+          <p:cNvSpPr/>
+          <p:nvPr/>
+        </p:nvSpPr>
+        <p:spPr>
+          <a:xfrm rot="0">
+            <a:off x="158650" y="990600"/>
+            <a:ext cx="18129350" cy="0"/>
+          </a:xfrm>
+          <a:prstGeom prst="line">
+            <a:avLst/>
+          </a:prstGeom>
+          <a:ln cap="rnd" w="123825">
+            <a:solidFill>
+              <a:srgbClr val="40C6CC"/>
+            </a:solidFill>
+            <a:prstDash val="solid"/>
+            <a:headEnd type="none" len="sm" w="sm"/>
+            <a:tailEnd type="none" len="sm" w="sm"/>
+          </a:ln>
+        </p:spPr>
+      </p:sp>
+      <p:pic>
+        <p:nvPicPr>
+          <p:cNvPr name="Picture 5" id="5"/>
+          <p:cNvPicPr>
+            <a:picLocks noChangeAspect="true"/>
+          </p:cNvPicPr>
+          <p:nvPr/>
+        </p:nvPicPr>
+        <p:blipFill>
+          <a:blip r:embed="rId2"/>
+          <a:srcRect l="0" t="0" r="0" b="0"/>
+          <a:stretch>
+            <a:fillRect/>
+          </a:stretch>
+        </p:blipFill>
+        <p:spPr>
+          <a:xfrm flipH="false" flipV="false" rot="0">
+            <a:off x="1028700" y="0"/>
+            <a:ext cx="7135565" cy="10287000"/>
+          </a:xfrm>
+          <a:prstGeom prst="rect">
+            <a:avLst/>
+          </a:prstGeom>
+        </p:spPr>
+      </p:pic>
+      <p:pic>
+        <p:nvPicPr>
+          <p:cNvPr name="Picture 6" id="6"/>
+          <p:cNvPicPr>
+            <a:picLocks noChangeAspect="true"/>
+          </p:cNvPicPr>
+          <p:nvPr/>
+        </p:nvPicPr>
+        <p:blipFill>
+          <a:blip r:embed="rId3"/>
+          <a:srcRect l="0" t="0" r="0" b="0"/>
+          <a:stretch>
+            <a:fillRect/>
+          </a:stretch>
+        </p:blipFill>
+        <p:spPr>
+          <a:xfrm flipH="false" flipV="false" rot="0">
+            <a:off x="10136545" y="0"/>
+            <a:ext cx="7122755" cy="10287000"/>
           </a:xfrm>
           <a:prstGeom prst="rect">
             <a:avLst/>
@@ -4979,8 +5106,8 @@
         </p:blipFill>
         <p:spPr>
           <a:xfrm flipH="false" flipV="false" rot="0">
-            <a:off x="10401300" y="0"/>
-            <a:ext cx="6858000" cy="10287000"/>
+            <a:off x="8674466" y="2160557"/>
+            <a:ext cx="3390931" cy="3346397"/>
           </a:xfrm>
           <a:prstGeom prst="rect">
             <a:avLst/>
@@ -5004,14 +5131,266 @@
         </p:blipFill>
         <p:spPr>
           <a:xfrm flipH="false" flipV="false" rot="0">
-            <a:off x="1028700" y="0"/>
-            <a:ext cx="6837758" cy="10287000"/>
+            <a:off x="13135556" y="2160557"/>
+            <a:ext cx="3371942" cy="3346397"/>
           </a:xfrm>
           <a:prstGeom prst="rect">
             <a:avLst/>
           </a:prstGeom>
         </p:spPr>
       </p:pic>
+      <p:sp>
+        <p:nvSpPr>
+          <p:cNvPr name="TextBox 4" id="4"/>
+          <p:cNvSpPr txBox="true"/>
+          <p:nvPr/>
+        </p:nvSpPr>
+        <p:spPr>
+          <a:xfrm rot="0">
+            <a:off x="551189" y="333041"/>
+            <a:ext cx="7548682" cy="1432546"/>
+          </a:xfrm>
+          <a:prstGeom prst="rect">
+            <a:avLst/>
+          </a:prstGeom>
+        </p:spPr>
+        <p:txBody>
+          <a:bodyPr anchor="t" rtlCol="false" tIns="0" lIns="0" bIns="0" rIns="0">
+            <a:spAutoFit/>
+          </a:bodyPr>
+          <a:lstStyle/>
+          <a:p>
+            <a:pPr algn="ctr">
+              <a:lnSpc>
+                <a:spcPts val="11760"/>
+              </a:lnSpc>
+            </a:pPr>
+            <a:r>
+              <a:rPr lang="en-US" sz="8400">
+                <a:solidFill>
+                  <a:srgbClr val="40C6CC"/>
+                </a:solidFill>
+                <a:latin typeface="Montserrat Semi-Bold"/>
+              </a:rPr>
+              <a:t>Как работает</a:t>
+            </a:r>
+          </a:p>
+        </p:txBody>
+      </p:sp>
+      <p:sp>
+        <p:nvSpPr>
+          <p:cNvPr name="TextBox 5" id="5"/>
+          <p:cNvSpPr txBox="true"/>
+          <p:nvPr/>
+        </p:nvSpPr>
+        <p:spPr>
+          <a:xfrm rot="0">
+            <a:off x="1028700" y="6717618"/>
+            <a:ext cx="16230600" cy="582295"/>
+          </a:xfrm>
+          <a:prstGeom prst="rect">
+            <a:avLst/>
+          </a:prstGeom>
+        </p:spPr>
+        <p:txBody>
+          <a:bodyPr anchor="t" rtlCol="false" tIns="0" lIns="0" bIns="0" rIns="0">
+            <a:spAutoFit/>
+          </a:bodyPr>
+          <a:lstStyle/>
+          <a:p>
+            <a:pPr algn="ctr">
+              <a:lnSpc>
+                <a:spcPts val="4759"/>
+              </a:lnSpc>
+            </a:pPr>
+            <a:r>
+              <a:rPr lang="en-US" sz="3399">
+                <a:solidFill>
+                  <a:srgbClr val="40C6CC"/>
+                </a:solidFill>
+                <a:latin typeface="Open Sans Light"/>
+              </a:rPr>
+              <a:t>4:0000100100010000:001000110000010:0000000010001000:0101001100101101</a:t>
+            </a:r>
+          </a:p>
+        </p:txBody>
+      </p:sp>
+      <p:sp>
+        <p:nvSpPr>
+          <p:cNvPr name="TextBox 6" id="6"/>
+          <p:cNvSpPr txBox="true"/>
+          <p:nvPr/>
+        </p:nvSpPr>
+        <p:spPr>
+          <a:xfrm rot="0">
+            <a:off x="1125784" y="5619978"/>
+            <a:ext cx="9406691" cy="812019"/>
+          </a:xfrm>
+          <a:prstGeom prst="rect">
+            <a:avLst/>
+          </a:prstGeom>
+        </p:spPr>
+        <p:txBody>
+          <a:bodyPr anchor="t" rtlCol="false" tIns="0" lIns="0" bIns="0" rIns="0">
+            <a:spAutoFit/>
+          </a:bodyPr>
+          <a:lstStyle/>
+          <a:p>
+            <a:pPr algn="ctr">
+              <a:lnSpc>
+                <a:spcPts val="6719"/>
+              </a:lnSpc>
+            </a:pPr>
+            <a:r>
+              <a:rPr lang="en-US" sz="4799">
+                <a:solidFill>
+                  <a:srgbClr val="FFFFFF"/>
+                </a:solidFill>
+                <a:latin typeface="Open Sans"/>
+              </a:rPr>
+              <a:t>Этап 2: Бинарный ключ (почти)</a:t>
+            </a:r>
+          </a:p>
+        </p:txBody>
+      </p:sp>
+      <p:sp>
+        <p:nvSpPr>
+          <p:cNvPr name="TextBox 7" id="7"/>
+          <p:cNvSpPr txBox="true"/>
+          <p:nvPr/>
+        </p:nvSpPr>
+        <p:spPr>
+          <a:xfrm rot="0">
+            <a:off x="1125784" y="7504706"/>
+            <a:ext cx="7134541" cy="796925"/>
+          </a:xfrm>
+          <a:prstGeom prst="rect">
+            <a:avLst/>
+          </a:prstGeom>
+        </p:spPr>
+        <p:txBody>
+          <a:bodyPr anchor="t" rtlCol="false" tIns="0" lIns="0" bIns="0" rIns="0">
+            <a:spAutoFit/>
+          </a:bodyPr>
+          <a:lstStyle/>
+          <a:p>
+            <a:pPr algn="ctr">
+              <a:lnSpc>
+                <a:spcPts val="6580"/>
+              </a:lnSpc>
+            </a:pPr>
+            <a:r>
+              <a:rPr lang="en-US" sz="4700">
+                <a:solidFill>
+                  <a:srgbClr val="FFFFFF"/>
+                </a:solidFill>
+                <a:latin typeface="Open Sans"/>
+              </a:rPr>
+              <a:t>Этап 3: 64-ричный ключ</a:t>
+            </a:r>
+          </a:p>
+        </p:txBody>
+      </p:sp>
+      <p:sp>
+        <p:nvSpPr>
+          <p:cNvPr name="TextBox 8" id="8"/>
+          <p:cNvSpPr txBox="true"/>
+          <p:nvPr/>
+        </p:nvSpPr>
+        <p:spPr>
+          <a:xfrm rot="0">
+            <a:off x="1125784" y="1670337"/>
+            <a:ext cx="6974086" cy="885190"/>
+          </a:xfrm>
+          <a:prstGeom prst="rect">
+            <a:avLst/>
+          </a:prstGeom>
+        </p:spPr>
+        <p:txBody>
+          <a:bodyPr anchor="t" rtlCol="false" tIns="0" lIns="0" bIns="0" rIns="0">
+            <a:spAutoFit/>
+          </a:bodyPr>
+          <a:lstStyle/>
+          <a:p>
+            <a:pPr algn="ctr">
+              <a:lnSpc>
+                <a:spcPts val="7279"/>
+              </a:lnSpc>
+            </a:pPr>
+            <a:r>
+              <a:rPr lang="en-US" sz="5199">
+                <a:solidFill>
+                  <a:srgbClr val="FFFFFF"/>
+                </a:solidFill>
+                <a:latin typeface="Open Sans"/>
+              </a:rPr>
+              <a:t>Этап 1: игровая карта</a:t>
+            </a:r>
+          </a:p>
+        </p:txBody>
+      </p:sp>
+      <p:sp>
+        <p:nvSpPr>
+          <p:cNvPr name="TextBox 9" id="9"/>
+          <p:cNvSpPr txBox="true"/>
+          <p:nvPr/>
+        </p:nvSpPr>
+        <p:spPr>
+          <a:xfrm rot="0">
+            <a:off x="1028700" y="8676005"/>
+            <a:ext cx="3919299" cy="582295"/>
+          </a:xfrm>
+          <a:prstGeom prst="rect">
+            <a:avLst/>
+          </a:prstGeom>
+        </p:spPr>
+        <p:txBody>
+          <a:bodyPr anchor="t" rtlCol="false" tIns="0" lIns="0" bIns="0" rIns="0">
+            <a:spAutoFit/>
+          </a:bodyPr>
+          <a:lstStyle/>
+          <a:p>
+            <a:pPr algn="ctr">
+              <a:lnSpc>
+                <a:spcPts val="4759"/>
+              </a:lnSpc>
+            </a:pPr>
+            <a:r>
+              <a:rPr lang="en-US" sz="3399">
+                <a:solidFill>
+                  <a:srgbClr val="40C6CC"/>
+                </a:solidFill>
+                <a:latin typeface="Open Sans Light"/>
+              </a:rPr>
+              <a:t>4:910:1182:88:532D</a:t>
+            </a:r>
+          </a:p>
+        </p:txBody>
+      </p:sp>
+      <p:sp>
+        <p:nvSpPr>
+          <p:cNvPr name="AutoShape 10" id="10"/>
+          <p:cNvSpPr/>
+          <p:nvPr/>
+        </p:nvSpPr>
+        <p:spPr>
+          <a:xfrm rot="5400000">
+            <a:off x="12595274" y="5095875"/>
+            <a:ext cx="10287000" cy="0"/>
+          </a:xfrm>
+          <a:prstGeom prst="line">
+            <a:avLst/>
+          </a:prstGeom>
+          <a:ln cap="rnd" w="95250">
+            <a:solidFill>
+              <a:srgbClr val="40C6CC"/>
+            </a:solidFill>
+            <a:prstDash val="solid"/>
+            <a:headEnd type="none" len="sm" w="sm"/>
+            <a:tailEnd type="none" len="sm" w="sm"/>
+          </a:ln>
+        </p:spPr>
+      </p:sp>
     </p:spTree>
   </p:cSld>
   <p:clrMapOvr>
@@ -5021,7 +5400,7 @@
 </file>
 
 <file path=ppt/slides/slide8.xml><?xml version="1.0" encoding="utf-8"?>
-<p:sld xmlns:p="http://schemas.openxmlformats.org/presentationml/2006/main" xmlns:a="http://schemas.openxmlformats.org/drawingml/2006/main">
+<p:sld xmlns:p="http://schemas.openxmlformats.org/presentationml/2006/main" xmlns:a="http://schemas.openxmlformats.org/drawingml/2006/main" xmlns:r="http://schemas.openxmlformats.org/officeDocument/2006/relationships">
   <p:cSld>
     <p:bg>
       <p:bgPr>
@@ -5059,7 +5438,7 @@
             <a:avLst/>
           </a:prstGeom>
           <a:solidFill>
-            <a:srgbClr val="40C6CC"/>
+            <a:srgbClr val="41514F"/>
           </a:solidFill>
         </p:spPr>
       </p:sp>
@@ -5101,30 +5480,55 @@
           </a:solidFill>
         </p:spPr>
       </p:sp>
+      <p:pic>
+        <p:nvPicPr>
+          <p:cNvPr name="Picture 5" id="5"/>
+          <p:cNvPicPr>
+            <a:picLocks noChangeAspect="true"/>
+          </p:cNvPicPr>
+          <p:nvPr/>
+        </p:nvPicPr>
+        <p:blipFill>
+          <a:blip r:embed="rId2"/>
+          <a:srcRect l="0" t="0" r="0" b="0"/>
+          <a:stretch>
+            <a:fillRect/>
+          </a:stretch>
+        </p:blipFill>
+        <p:spPr>
+          <a:xfrm flipH="false" flipV="false" rot="0">
+            <a:off x="10168468" y="500820"/>
+            <a:ext cx="7545857" cy="9319455"/>
+          </a:xfrm>
+          <a:prstGeom prst="rect">
+            <a:avLst/>
+          </a:prstGeom>
+        </p:spPr>
+      </p:pic>
       <p:grpSp>
         <p:nvGrpSpPr>
-          <p:cNvPr name="Group 5" id="5"/>
+          <p:cNvPr name="Group 6" id="6"/>
           <p:cNvGrpSpPr/>
           <p:nvPr/>
         </p:nvGrpSpPr>
         <p:grpSpPr>
           <a:xfrm rot="0">
-            <a:off x="9390774" y="1028700"/>
-            <a:ext cx="7868526" cy="3037098"/>
+            <a:off x="1275474" y="1026608"/>
+            <a:ext cx="7868526" cy="3039190"/>
             <a:chOff x="0" y="0"/>
-            <a:chExt cx="10491368" cy="4049464"/>
+            <a:chExt cx="10491368" cy="4052254"/>
           </a:xfrm>
         </p:grpSpPr>
         <p:sp>
           <p:nvSpPr>
-            <p:cNvPr name="TextBox 6" id="6"/>
+            <p:cNvPr name="TextBox 7" id="7"/>
             <p:cNvSpPr txBox="true"/>
             <p:nvPr/>
           </p:nvSpPr>
           <p:spPr>
             <a:xfrm rot="0">
               <a:off x="0" y="-57150"/>
-              <a:ext cx="10491368" cy="2946018"/>
+              <a:ext cx="10491368" cy="2948808"/>
             </a:xfrm>
             <a:prstGeom prst="rect">
               <a:avLst/>
@@ -5144,7 +5548,7 @@
               <a:r>
                 <a:rPr lang="en-US" sz="6832">
                   <a:solidFill>
-                    <a:srgbClr val="000000"/>
+                    <a:srgbClr val="40C6CC"/>
                   </a:solidFill>
                   <a:latin typeface="Montserrat Semi-Bold"/>
                 </a:rPr>
@@ -5155,13 +5559,13 @@
         </p:sp>
         <p:sp>
           <p:nvSpPr>
-            <p:cNvPr name="TextBox 7" id="7"/>
+            <p:cNvPr name="TextBox 8" id="8"/>
             <p:cNvSpPr txBox="true"/>
             <p:nvPr/>
           </p:nvSpPr>
           <p:spPr>
             <a:xfrm rot="0">
-              <a:off x="0" y="2996322"/>
+              <a:off x="0" y="2999112"/>
               <a:ext cx="10491368" cy="1053142"/>
             </a:xfrm>
             <a:prstGeom prst="rect">
@@ -5183,6 +5587,54 @@
           </p:txBody>
         </p:sp>
       </p:grpSp>
+      <p:sp>
+        <p:nvSpPr>
+          <p:cNvPr name="AutoShape 9" id="9"/>
+          <p:cNvSpPr/>
+          <p:nvPr/>
+        </p:nvSpPr>
+        <p:spPr>
+          <a:xfrm rot="0">
+            <a:off x="-283195" y="9772650"/>
+            <a:ext cx="18571195" cy="0"/>
+          </a:xfrm>
+          <a:prstGeom prst="line">
+            <a:avLst/>
+          </a:prstGeom>
+          <a:ln cap="rnd" w="95250">
+            <a:solidFill>
+              <a:srgbClr val="40C6CC"/>
+            </a:solidFill>
+            <a:prstDash val="solid"/>
+            <a:headEnd type="none" len="sm" w="sm"/>
+            <a:tailEnd type="none" len="sm" w="sm"/>
+          </a:ln>
+        </p:spPr>
+      </p:sp>
+      <p:sp>
+        <p:nvSpPr>
+          <p:cNvPr name="AutoShape 10" id="10"/>
+          <p:cNvSpPr/>
+          <p:nvPr/>
+        </p:nvSpPr>
+        <p:spPr>
+          <a:xfrm rot="0">
+            <a:off x="-283195" y="405570"/>
+            <a:ext cx="19155395" cy="0"/>
+          </a:xfrm>
+          <a:prstGeom prst="line">
+            <a:avLst/>
+          </a:prstGeom>
+          <a:ln cap="rnd" w="95250">
+            <a:solidFill>
+              <a:srgbClr val="40C6CC"/>
+            </a:solidFill>
+            <a:prstDash val="solid"/>
+            <a:headEnd type="none" len="sm" w="sm"/>
+            <a:tailEnd type="none" len="sm" w="sm"/>
+          </a:ln>
+        </p:spPr>
+      </p:sp>
     </p:spTree>
   </p:cSld>
   <p:clrMapOvr>
@@ -5192,12 +5644,12 @@
 </file>
 
 <file path=ppt/slides/slide9.xml><?xml version="1.0" encoding="utf-8"?>
-<p:sld xmlns:p="http://schemas.openxmlformats.org/presentationml/2006/main" xmlns:a="http://schemas.openxmlformats.org/drawingml/2006/main">
+<p:sld xmlns:p="http://schemas.openxmlformats.org/presentationml/2006/main" xmlns:a="http://schemas.openxmlformats.org/drawingml/2006/main" xmlns:r="http://schemas.openxmlformats.org/officeDocument/2006/relationships">
   <p:cSld>
     <p:bg>
       <p:bgPr>
         <a:solidFill>
-          <a:srgbClr val="F7F9F8"/>
+          <a:srgbClr val="231F1D"/>
         </a:solidFill>
       </p:bgPr>
     </p:bg>
@@ -5215,88 +5667,165 @@
           <a:chExt cx="0" cy="0"/>
         </a:xfrm>
       </p:grpSpPr>
-      <p:grpSp>
-        <p:nvGrpSpPr>
-          <p:cNvPr name="Group 2" id="2"/>
-          <p:cNvGrpSpPr/>
-          <p:nvPr/>
-        </p:nvGrpSpPr>
-        <p:grpSpPr>
+      <p:sp>
+        <p:nvSpPr>
+          <p:cNvPr name="AutoShape 2" id="2"/>
+          <p:cNvSpPr/>
+          <p:nvPr/>
+        </p:nvSpPr>
+        <p:spPr>
           <a:xfrm rot="0">
-            <a:off x="0" y="480238"/>
-            <a:ext cx="9603855" cy="3224781"/>
-            <a:chOff x="0" y="0"/>
-            <a:chExt cx="12805140" cy="4299708"/>
-          </a:xfrm>
-        </p:grpSpPr>
-        <p:sp>
-          <p:nvSpPr>
-            <p:cNvPr name="TextBox 3" id="3"/>
-            <p:cNvSpPr txBox="true"/>
-            <p:nvPr/>
-          </p:nvSpPr>
-          <p:spPr>
-            <a:xfrm rot="0">
-              <a:off x="0" y="-57150"/>
-              <a:ext cx="12805140" cy="2940303"/>
-            </a:xfrm>
-            <a:prstGeom prst="rect">
-              <a:avLst/>
-            </a:prstGeom>
-          </p:spPr>
-          <p:txBody>
-            <a:bodyPr anchor="t" rtlCol="false" tIns="0" lIns="0" bIns="0" rIns="0">
-              <a:spAutoFit/>
-            </a:bodyPr>
-            <a:lstStyle/>
-            <a:p>
-              <a:pPr algn="l">
-                <a:lnSpc>
-                  <a:spcPts val="8874"/>
-                </a:lnSpc>
-              </a:pPr>
-              <a:r>
-                <a:rPr lang="en-US" sz="6826">
-                  <a:solidFill>
-                    <a:srgbClr val="000000"/>
-                  </a:solidFill>
-                  <a:latin typeface="Montserrat Semi-Bold"/>
-                </a:rPr>
-                <a:t>СОХРАНЕНИЕ РЕЗУЛЬТАТОВ</a:t>
-              </a:r>
-            </a:p>
-          </p:txBody>
-        </p:sp>
-        <p:sp>
-          <p:nvSpPr>
-            <p:cNvPr name="TextBox 4" id="4"/>
-            <p:cNvSpPr txBox="true"/>
-            <p:nvPr/>
-          </p:nvSpPr>
-          <p:spPr>
-            <a:xfrm rot="0">
-              <a:off x="0" y="3016262"/>
-              <a:ext cx="12805140" cy="1283446"/>
-            </a:xfrm>
-            <a:prstGeom prst="rect">
-              <a:avLst/>
-            </a:prstGeom>
-          </p:spPr>
-          <p:txBody>
-            <a:bodyPr anchor="t" rtlCol="false" tIns="0" lIns="0" bIns="0" rIns="0">
-              <a:spAutoFit/>
-            </a:bodyPr>
-            <a:lstStyle/>
-            <a:p>
-              <a:pPr algn="l">
-                <a:lnSpc>
-                  <a:spcPts val="8083"/>
-                </a:lnSpc>
-              </a:pPr>
-            </a:p>
-          </p:txBody>
-        </p:sp>
-      </p:grpSp>
+            <a:off x="-125244" y="5843707"/>
+            <a:ext cx="18538488" cy="0"/>
+          </a:xfrm>
+          <a:prstGeom prst="line">
+            <a:avLst/>
+          </a:prstGeom>
+          <a:ln cap="rnd" w="180975">
+            <a:solidFill>
+              <a:srgbClr val="40C6CC"/>
+            </a:solidFill>
+            <a:prstDash val="solid"/>
+            <a:headEnd type="none" len="sm" w="sm"/>
+            <a:tailEnd type="none" len="sm" w="sm"/>
+          </a:ln>
+        </p:spPr>
+      </p:sp>
+      <p:sp>
+        <p:nvSpPr>
+          <p:cNvPr name="AutoShape 3" id="3"/>
+          <p:cNvSpPr/>
+          <p:nvPr/>
+        </p:nvSpPr>
+        <p:spPr>
+          <a:xfrm rot="0">
+            <a:off x="0" y="637654"/>
+            <a:ext cx="18288000" cy="0"/>
+          </a:xfrm>
+          <a:prstGeom prst="line">
+            <a:avLst/>
+          </a:prstGeom>
+          <a:ln cap="rnd" w="142875">
+            <a:solidFill>
+              <a:srgbClr val="40C6CC"/>
+            </a:solidFill>
+            <a:prstDash val="solid"/>
+            <a:headEnd type="none" len="sm" w="sm"/>
+            <a:tailEnd type="none" len="sm" w="sm"/>
+          </a:ln>
+        </p:spPr>
+      </p:sp>
+      <p:pic>
+        <p:nvPicPr>
+          <p:cNvPr name="Picture 4" id="4"/>
+          <p:cNvPicPr>
+            <a:picLocks noChangeAspect="true"/>
+          </p:cNvPicPr>
+          <p:nvPr/>
+        </p:nvPicPr>
+        <p:blipFill>
+          <a:blip r:embed="rId2"/>
+          <a:srcRect l="0" t="0" r="0" b="0"/>
+          <a:stretch>
+            <a:fillRect/>
+          </a:stretch>
+        </p:blipFill>
+        <p:spPr>
+          <a:xfrm flipH="false" flipV="false" rot="0">
+            <a:off x="9962127" y="0"/>
+            <a:ext cx="8325873" cy="10287000"/>
+          </a:xfrm>
+          <a:prstGeom prst="rect">
+            <a:avLst/>
+          </a:prstGeom>
+        </p:spPr>
+      </p:pic>
+      <p:sp>
+        <p:nvSpPr>
+          <p:cNvPr name="TextBox 5" id="5"/>
+          <p:cNvSpPr txBox="true"/>
+          <p:nvPr/>
+        </p:nvSpPr>
+        <p:spPr>
+          <a:xfrm rot="0">
+            <a:off x="1078647" y="895350"/>
+            <a:ext cx="7490103" cy="4718050"/>
+          </a:xfrm>
+          <a:prstGeom prst="rect">
+            <a:avLst/>
+          </a:prstGeom>
+        </p:spPr>
+        <p:txBody>
+          <a:bodyPr anchor="t" rtlCol="false" tIns="0" lIns="0" bIns="0" rIns="0">
+            <a:spAutoFit/>
+          </a:bodyPr>
+          <a:lstStyle/>
+          <a:p>
+            <a:pPr algn="ctr">
+              <a:lnSpc>
+                <a:spcPts val="9379"/>
+              </a:lnSpc>
+            </a:pPr>
+            <a:r>
+              <a:rPr lang="en-US" sz="6699">
+                <a:solidFill>
+                  <a:srgbClr val="40C6CC"/>
+                </a:solidFill>
+                <a:latin typeface="Montserrat Semi-Bold"/>
+              </a:rPr>
+              <a:t>Можно </a:t>
+            </a:r>
+          </a:p>
+          <a:p>
+            <a:pPr algn="ctr">
+              <a:lnSpc>
+                <a:spcPts val="9379"/>
+              </a:lnSpc>
+            </a:pPr>
+            <a:r>
+              <a:rPr lang="en-US" sz="6699">
+                <a:solidFill>
+                  <a:srgbClr val="40C6CC"/>
+                </a:solidFill>
+                <a:latin typeface="Montserrat Semi-Bold"/>
+              </a:rPr>
+              <a:t>переназначить</a:t>
+            </a:r>
+          </a:p>
+          <a:p>
+            <a:pPr algn="ctr">
+              <a:lnSpc>
+                <a:spcPts val="9379"/>
+              </a:lnSpc>
+            </a:pPr>
+            <a:r>
+              <a:rPr lang="en-US" sz="6699">
+                <a:solidFill>
+                  <a:srgbClr val="40C6CC"/>
+                </a:solidFill>
+                <a:latin typeface="Montserrat Semi-Bold"/>
+              </a:rPr>
+              <a:t> кнопки для </a:t>
+            </a:r>
+          </a:p>
+          <a:p>
+            <a:pPr algn="ctr">
+              <a:lnSpc>
+                <a:spcPts val="9379"/>
+              </a:lnSpc>
+            </a:pPr>
+            <a:r>
+              <a:rPr lang="en-US" sz="6699">
+                <a:solidFill>
+                  <a:srgbClr val="40C6CC"/>
+                </a:solidFill>
+                <a:latin typeface="Montserrat Semi-Bold"/>
+              </a:rPr>
+              <a:t>своего удобства</a:t>
+            </a:r>
+          </a:p>
+        </p:txBody>
+      </p:sp>
     </p:spTree>
   </p:cSld>
   <p:clrMapOvr>

</xml_diff>